<commit_message>
Added week 7 ppt, solutions to week 7 use cases and solutions to hands on exercises from week 4 and week 6
</commit_message>
<xml_diff>
--- a/week4/PythonPresentationWeek4.pptx
+++ b/week4/PythonPresentationWeek4.pptx
@@ -1252,6 +1252,13 @@
         </dgm:presLayoutVars>
       </dgm:prSet>
       <dgm:spPr/>
+      <dgm:t>
+        <a:bodyPr/>
+        <a:lstStyle/>
+        <a:p>
+          <a:endParaRPr lang="en-US"/>
+        </a:p>
+      </dgm:t>
     </dgm:pt>
     <dgm:pt modelId="{4503D6D9-EE76-45CF-92D0-F48C86A714E3}" type="pres">
       <dgm:prSet presAssocID="{2441D3CF-DCAD-4AA1-9DCB-7DCE65E9CFB0}" presName="parentLin" presStyleCnt="0"/>
@@ -1260,6 +1267,13 @@
     <dgm:pt modelId="{9BBD5306-58FE-433D-8C13-5D167B921D81}" type="pres">
       <dgm:prSet presAssocID="{2441D3CF-DCAD-4AA1-9DCB-7DCE65E9CFB0}" presName="parentLeftMargin" presStyleLbl="node1" presStyleIdx="0" presStyleCnt="7"/>
       <dgm:spPr/>
+      <dgm:t>
+        <a:bodyPr/>
+        <a:lstStyle/>
+        <a:p>
+          <a:endParaRPr lang="en-US"/>
+        </a:p>
+      </dgm:t>
     </dgm:pt>
     <dgm:pt modelId="{9EB2B872-AF6A-4097-9DC5-DA51AA82E595}" type="pres">
       <dgm:prSet presAssocID="{2441D3CF-DCAD-4AA1-9DCB-7DCE65E9CFB0}" presName="parentText" presStyleLbl="node1" presStyleIdx="0" presStyleCnt="7">
@@ -1269,6 +1283,13 @@
         </dgm:presLayoutVars>
       </dgm:prSet>
       <dgm:spPr/>
+      <dgm:t>
+        <a:bodyPr/>
+        <a:lstStyle/>
+        <a:p>
+          <a:endParaRPr lang="en-US"/>
+        </a:p>
+      </dgm:t>
     </dgm:pt>
     <dgm:pt modelId="{33969700-8B0F-4649-88FF-413EEB2D2599}" type="pres">
       <dgm:prSet presAssocID="{2441D3CF-DCAD-4AA1-9DCB-7DCE65E9CFB0}" presName="negativeSpace" presStyleCnt="0"/>
@@ -1293,6 +1314,13 @@
     <dgm:pt modelId="{9A752E06-C8C7-4635-B74A-8F490BC7913E}" type="pres">
       <dgm:prSet presAssocID="{449737C4-5008-4883-9D35-B50B9E1D0365}" presName="parentLeftMargin" presStyleLbl="node1" presStyleIdx="0" presStyleCnt="7"/>
       <dgm:spPr/>
+      <dgm:t>
+        <a:bodyPr/>
+        <a:lstStyle/>
+        <a:p>
+          <a:endParaRPr lang="en-US"/>
+        </a:p>
+      </dgm:t>
     </dgm:pt>
     <dgm:pt modelId="{E6021B6F-4BF1-49F7-9BAA-7A50081B6E91}" type="pres">
       <dgm:prSet presAssocID="{449737C4-5008-4883-9D35-B50B9E1D0365}" presName="parentText" presStyleLbl="node1" presStyleIdx="1" presStyleCnt="7">
@@ -1302,6 +1330,13 @@
         </dgm:presLayoutVars>
       </dgm:prSet>
       <dgm:spPr/>
+      <dgm:t>
+        <a:bodyPr/>
+        <a:lstStyle/>
+        <a:p>
+          <a:endParaRPr lang="en-US"/>
+        </a:p>
+      </dgm:t>
     </dgm:pt>
     <dgm:pt modelId="{DA77033E-E2C5-4752-8323-0C85330BC610}" type="pres">
       <dgm:prSet presAssocID="{449737C4-5008-4883-9D35-B50B9E1D0365}" presName="negativeSpace" presStyleCnt="0"/>
@@ -1326,6 +1361,13 @@
     <dgm:pt modelId="{6D4B82DD-A4B8-463D-9E9E-2FB5E6EA4439}" type="pres">
       <dgm:prSet presAssocID="{08AB1BFE-2FF8-4E08-AB67-659848F1B8CA}" presName="parentLeftMargin" presStyleLbl="node1" presStyleIdx="1" presStyleCnt="7"/>
       <dgm:spPr/>
+      <dgm:t>
+        <a:bodyPr/>
+        <a:lstStyle/>
+        <a:p>
+          <a:endParaRPr lang="en-US"/>
+        </a:p>
+      </dgm:t>
     </dgm:pt>
     <dgm:pt modelId="{EEA3F2AE-3F24-489D-83E3-7F4B06DD9765}" type="pres">
       <dgm:prSet presAssocID="{08AB1BFE-2FF8-4E08-AB67-659848F1B8CA}" presName="parentText" presStyleLbl="node1" presStyleIdx="2" presStyleCnt="7">
@@ -1335,6 +1377,13 @@
         </dgm:presLayoutVars>
       </dgm:prSet>
       <dgm:spPr/>
+      <dgm:t>
+        <a:bodyPr/>
+        <a:lstStyle/>
+        <a:p>
+          <a:endParaRPr lang="en-US"/>
+        </a:p>
+      </dgm:t>
     </dgm:pt>
     <dgm:pt modelId="{75D0831F-3B63-4EBB-A0B1-53B7C57588DE}" type="pres">
       <dgm:prSet presAssocID="{08AB1BFE-2FF8-4E08-AB67-659848F1B8CA}" presName="negativeSpace" presStyleCnt="0"/>
@@ -1359,6 +1408,13 @@
     <dgm:pt modelId="{9ED2A6DE-E1F0-4B97-A932-C624D7625319}" type="pres">
       <dgm:prSet presAssocID="{C94F9B29-0176-4B32-946A-81F36987B77C}" presName="parentLeftMargin" presStyleLbl="node1" presStyleIdx="2" presStyleCnt="7"/>
       <dgm:spPr/>
+      <dgm:t>
+        <a:bodyPr/>
+        <a:lstStyle/>
+        <a:p>
+          <a:endParaRPr lang="en-US"/>
+        </a:p>
+      </dgm:t>
     </dgm:pt>
     <dgm:pt modelId="{44BA7E45-6568-4082-BD0C-21BF64E58C92}" type="pres">
       <dgm:prSet presAssocID="{C94F9B29-0176-4B32-946A-81F36987B77C}" presName="parentText" presStyleLbl="node1" presStyleIdx="3" presStyleCnt="7">
@@ -1368,6 +1424,13 @@
         </dgm:presLayoutVars>
       </dgm:prSet>
       <dgm:spPr/>
+      <dgm:t>
+        <a:bodyPr/>
+        <a:lstStyle/>
+        <a:p>
+          <a:endParaRPr lang="en-US"/>
+        </a:p>
+      </dgm:t>
     </dgm:pt>
     <dgm:pt modelId="{38038E59-22A8-4FD9-A397-38BE4D2D2470}" type="pres">
       <dgm:prSet presAssocID="{C94F9B29-0176-4B32-946A-81F36987B77C}" presName="negativeSpace" presStyleCnt="0"/>
@@ -1392,6 +1455,13 @@
     <dgm:pt modelId="{87D30ABD-B09D-4292-B292-95CAEB19FD4E}" type="pres">
       <dgm:prSet presAssocID="{961DFF81-87C5-42FE-88FC-CF45597073D0}" presName="parentLeftMargin" presStyleLbl="node1" presStyleIdx="3" presStyleCnt="7"/>
       <dgm:spPr/>
+      <dgm:t>
+        <a:bodyPr/>
+        <a:lstStyle/>
+        <a:p>
+          <a:endParaRPr lang="en-US"/>
+        </a:p>
+      </dgm:t>
     </dgm:pt>
     <dgm:pt modelId="{01FFF8B0-CD1F-4F53-AB7E-29B6C948A2B1}" type="pres">
       <dgm:prSet presAssocID="{961DFF81-87C5-42FE-88FC-CF45597073D0}" presName="parentText" presStyleLbl="node1" presStyleIdx="4" presStyleCnt="7">
@@ -1401,6 +1471,13 @@
         </dgm:presLayoutVars>
       </dgm:prSet>
       <dgm:spPr/>
+      <dgm:t>
+        <a:bodyPr/>
+        <a:lstStyle/>
+        <a:p>
+          <a:endParaRPr lang="en-US"/>
+        </a:p>
+      </dgm:t>
     </dgm:pt>
     <dgm:pt modelId="{7411150B-543B-4171-B752-DB6DCE58F467}" type="pres">
       <dgm:prSet presAssocID="{961DFF81-87C5-42FE-88FC-CF45597073D0}" presName="negativeSpace" presStyleCnt="0"/>
@@ -1425,6 +1502,13 @@
     <dgm:pt modelId="{551048E4-398F-4C1E-9441-821EADDCAB01}" type="pres">
       <dgm:prSet presAssocID="{E11C88C8-59F0-40F5-A714-56F6F8B84CD6}" presName="parentLeftMargin" presStyleLbl="node1" presStyleIdx="4" presStyleCnt="7"/>
       <dgm:spPr/>
+      <dgm:t>
+        <a:bodyPr/>
+        <a:lstStyle/>
+        <a:p>
+          <a:endParaRPr lang="en-US"/>
+        </a:p>
+      </dgm:t>
     </dgm:pt>
     <dgm:pt modelId="{ACFE3EAD-6DAF-4414-ADCE-CEFF338717F4}" type="pres">
       <dgm:prSet presAssocID="{E11C88C8-59F0-40F5-A714-56F6F8B84CD6}" presName="parentText" presStyleLbl="node1" presStyleIdx="5" presStyleCnt="7">
@@ -1434,6 +1518,13 @@
         </dgm:presLayoutVars>
       </dgm:prSet>
       <dgm:spPr/>
+      <dgm:t>
+        <a:bodyPr/>
+        <a:lstStyle/>
+        <a:p>
+          <a:endParaRPr lang="en-US"/>
+        </a:p>
+      </dgm:t>
     </dgm:pt>
     <dgm:pt modelId="{224DA6A1-904A-47BB-A957-C00007177DAF}" type="pres">
       <dgm:prSet presAssocID="{E11C88C8-59F0-40F5-A714-56F6F8B84CD6}" presName="negativeSpace" presStyleCnt="0"/>
@@ -1458,6 +1549,13 @@
     <dgm:pt modelId="{4CF1124C-A0ED-4056-9201-ABEC2856F27D}" type="pres">
       <dgm:prSet presAssocID="{1E7F9215-8D51-418C-BCB9-5121F3DAB11F}" presName="parentLeftMargin" presStyleLbl="node1" presStyleIdx="5" presStyleCnt="7"/>
       <dgm:spPr/>
+      <dgm:t>
+        <a:bodyPr/>
+        <a:lstStyle/>
+        <a:p>
+          <a:endParaRPr lang="en-US"/>
+        </a:p>
+      </dgm:t>
     </dgm:pt>
     <dgm:pt modelId="{E9492916-5894-48C9-8838-772B00FD07E4}" type="pres">
       <dgm:prSet presAssocID="{1E7F9215-8D51-418C-BCB9-5121F3DAB11F}" presName="parentText" presStyleLbl="node1" presStyleIdx="6" presStyleCnt="7">
@@ -1467,6 +1565,13 @@
         </dgm:presLayoutVars>
       </dgm:prSet>
       <dgm:spPr/>
+      <dgm:t>
+        <a:bodyPr/>
+        <a:lstStyle/>
+        <a:p>
+          <a:endParaRPr lang="en-US"/>
+        </a:p>
+      </dgm:t>
     </dgm:pt>
     <dgm:pt modelId="{0BBF87AB-379E-41A5-848F-4505A24608E0}" type="pres">
       <dgm:prSet presAssocID="{1E7F9215-8D51-418C-BCB9-5121F3DAB11F}" presName="negativeSpace" presStyleCnt="0"/>
@@ -1482,28 +1587,28 @@
     </dgm:pt>
   </dgm:ptLst>
   <dgm:cxnLst>
+    <dgm:cxn modelId="{A790524F-9E6A-49B3-A5B6-6881AFCCDD21}" type="presOf" srcId="{E11C88C8-59F0-40F5-A714-56F6F8B84CD6}" destId="{551048E4-398F-4C1E-9441-821EADDCAB01}" srcOrd="0" destOrd="0" presId="urn:microsoft.com/office/officeart/2005/8/layout/list1"/>
     <dgm:cxn modelId="{66DB930C-72C0-435D-B1A6-FA99C57E86D2}" type="presOf" srcId="{2441D3CF-DCAD-4AA1-9DCB-7DCE65E9CFB0}" destId="{9EB2B872-AF6A-4097-9DC5-DA51AA82E595}" srcOrd="1" destOrd="0" presId="urn:microsoft.com/office/officeart/2005/8/layout/list1"/>
+    <dgm:cxn modelId="{9083D76D-BE5D-4B5B-A340-D5FCE7960F2D}" type="presOf" srcId="{449737C4-5008-4883-9D35-B50B9E1D0365}" destId="{9A752E06-C8C7-4635-B74A-8F490BC7913E}" srcOrd="0" destOrd="0" presId="urn:microsoft.com/office/officeart/2005/8/layout/list1"/>
+    <dgm:cxn modelId="{03E3A3FE-CCCB-4168-BC16-5AB654C45D50}" srcId="{AF8F3852-418C-4CCA-9422-5CA21CCE84D6}" destId="{961DFF81-87C5-42FE-88FC-CF45597073D0}" srcOrd="4" destOrd="0" parTransId="{68B155CE-839B-478C-9B8F-F62DB7696E3D}" sibTransId="{9B883FEB-34F4-460F-9CDB-3BC0D8AC5176}"/>
+    <dgm:cxn modelId="{35CF7BA5-9923-478D-A406-8D8F734D69D9}" type="presOf" srcId="{C94F9B29-0176-4B32-946A-81F36987B77C}" destId="{9ED2A6DE-E1F0-4B97-A932-C624D7625319}" srcOrd="0" destOrd="0" presId="urn:microsoft.com/office/officeart/2005/8/layout/list1"/>
+    <dgm:cxn modelId="{C6B61930-0D69-44BB-B9A5-9E6076F6522C}" type="presOf" srcId="{08AB1BFE-2FF8-4E08-AB67-659848F1B8CA}" destId="{6D4B82DD-A4B8-463D-9E9E-2FB5E6EA4439}" srcOrd="0" destOrd="0" presId="urn:microsoft.com/office/officeart/2005/8/layout/list1"/>
+    <dgm:cxn modelId="{66CDDAF3-1987-42E2-A532-87B360C04E6E}" type="presOf" srcId="{E11C88C8-59F0-40F5-A714-56F6F8B84CD6}" destId="{ACFE3EAD-6DAF-4414-ADCE-CEFF338717F4}" srcOrd="1" destOrd="0" presId="urn:microsoft.com/office/officeart/2005/8/layout/list1"/>
+    <dgm:cxn modelId="{EA7A0326-856F-4A65-8826-DAE014B80CEC}" type="presOf" srcId="{961DFF81-87C5-42FE-88FC-CF45597073D0}" destId="{87D30ABD-B09D-4292-B292-95CAEB19FD4E}" srcOrd="0" destOrd="0" presId="urn:microsoft.com/office/officeart/2005/8/layout/list1"/>
+    <dgm:cxn modelId="{17F5411A-734C-49F2-ADA4-1B0F545F4F69}" srcId="{AF8F3852-418C-4CCA-9422-5CA21CCE84D6}" destId="{1E7F9215-8D51-418C-BCB9-5121F3DAB11F}" srcOrd="6" destOrd="0" parTransId="{0D43A1FF-CA89-4E4B-9D58-B05AE32D3588}" sibTransId="{91471EED-EC5C-40E2-B389-46E54941755C}"/>
+    <dgm:cxn modelId="{433CB0E2-E910-4DFA-A83F-B3A3DC6ED55D}" type="presOf" srcId="{449737C4-5008-4883-9D35-B50B9E1D0365}" destId="{E6021B6F-4BF1-49F7-9BAA-7A50081B6E91}" srcOrd="1" destOrd="0" presId="urn:microsoft.com/office/officeart/2005/8/layout/list1"/>
+    <dgm:cxn modelId="{EC771F56-D8AF-4610-A493-6CF1DC2BA72C}" srcId="{AF8F3852-418C-4CCA-9422-5CA21CCE84D6}" destId="{449737C4-5008-4883-9D35-B50B9E1D0365}" srcOrd="1" destOrd="0" parTransId="{AB8E9C9B-2F55-462D-96BA-F7E756FFC44F}" sibTransId="{F41FC8E8-932C-4C4E-BCCB-049D4B725DF2}"/>
+    <dgm:cxn modelId="{D5ADA4B5-035D-40EC-B510-ED7D74C2C719}" type="presOf" srcId="{2441D3CF-DCAD-4AA1-9DCB-7DCE65E9CFB0}" destId="{9BBD5306-58FE-433D-8C13-5D167B921D81}" srcOrd="0" destOrd="0" presId="urn:microsoft.com/office/officeart/2005/8/layout/list1"/>
     <dgm:cxn modelId="{6A4E840D-C025-4DF9-BB65-A99F78B3042E}" srcId="{AF8F3852-418C-4CCA-9422-5CA21CCE84D6}" destId="{E11C88C8-59F0-40F5-A714-56F6F8B84CD6}" srcOrd="5" destOrd="0" parTransId="{C0F570E9-9232-47E1-B3B2-82893A7C0CCA}" sibTransId="{ED1C7C02-A4C5-4AB3-8FD8-B27992F7F775}"/>
-    <dgm:cxn modelId="{17F5411A-734C-49F2-ADA4-1B0F545F4F69}" srcId="{AF8F3852-418C-4CCA-9422-5CA21CCE84D6}" destId="{1E7F9215-8D51-418C-BCB9-5121F3DAB11F}" srcOrd="6" destOrd="0" parTransId="{0D43A1FF-CA89-4E4B-9D58-B05AE32D3588}" sibTransId="{91471EED-EC5C-40E2-B389-46E54941755C}"/>
-    <dgm:cxn modelId="{EA7A0326-856F-4A65-8826-DAE014B80CEC}" type="presOf" srcId="{961DFF81-87C5-42FE-88FC-CF45597073D0}" destId="{87D30ABD-B09D-4292-B292-95CAEB19FD4E}" srcOrd="0" destOrd="0" presId="urn:microsoft.com/office/officeart/2005/8/layout/list1"/>
-    <dgm:cxn modelId="{C6B61930-0D69-44BB-B9A5-9E6076F6522C}" type="presOf" srcId="{08AB1BFE-2FF8-4E08-AB67-659848F1B8CA}" destId="{6D4B82DD-A4B8-463D-9E9E-2FB5E6EA4439}" srcOrd="0" destOrd="0" presId="urn:microsoft.com/office/officeart/2005/8/layout/list1"/>
     <dgm:cxn modelId="{1481E03D-DABE-4122-B5BB-B795F024F6B4}" srcId="{AF8F3852-418C-4CCA-9422-5CA21CCE84D6}" destId="{C94F9B29-0176-4B32-946A-81F36987B77C}" srcOrd="3" destOrd="0" parTransId="{F8BF491C-2CB9-41EA-9BA5-4EA9668F9F91}" sibTransId="{93477452-2C44-47D9-98AC-24D03110E11D}"/>
+    <dgm:cxn modelId="{37060273-8046-46E3-AE02-6101C7B25F4D}" srcId="{AF8F3852-418C-4CCA-9422-5CA21CCE84D6}" destId="{08AB1BFE-2FF8-4E08-AB67-659848F1B8CA}" srcOrd="2" destOrd="0" parTransId="{071D4CA8-A1C5-4C39-A38E-9F2A0A24ECF1}" sibTransId="{5429D7E4-5EF3-43E8-806A-B16531DF679F}"/>
+    <dgm:cxn modelId="{705A3C40-184D-4F58-8EE4-A43D0268E02D}" type="presOf" srcId="{AF8F3852-418C-4CCA-9422-5CA21CCE84D6}" destId="{F689F3C3-4244-4335-A2AD-354FE4F53E7F}" srcOrd="0" destOrd="0" presId="urn:microsoft.com/office/officeart/2005/8/layout/list1"/>
+    <dgm:cxn modelId="{050FAAF6-88BF-43C4-B57E-94FD85AD993B}" type="presOf" srcId="{C94F9B29-0176-4B32-946A-81F36987B77C}" destId="{44BA7E45-6568-4082-BD0C-21BF64E58C92}" srcOrd="1" destOrd="0" presId="urn:microsoft.com/office/officeart/2005/8/layout/list1"/>
+    <dgm:cxn modelId="{5994E697-22FB-4F38-BCE7-E1795E4C4F69}" type="presOf" srcId="{1E7F9215-8D51-418C-BCB9-5121F3DAB11F}" destId="{E9492916-5894-48C9-8838-772B00FD07E4}" srcOrd="1" destOrd="0" presId="urn:microsoft.com/office/officeart/2005/8/layout/list1"/>
+    <dgm:cxn modelId="{BE85F947-A8BA-47CC-98BF-9F89A119843D}" type="presOf" srcId="{1E7F9215-8D51-418C-BCB9-5121F3DAB11F}" destId="{4CF1124C-A0ED-4056-9201-ABEC2856F27D}" srcOrd="0" destOrd="0" presId="urn:microsoft.com/office/officeart/2005/8/layout/list1"/>
+    <dgm:cxn modelId="{A2248066-0C5F-4CE2-B655-6D5F0E756B7F}" type="presOf" srcId="{961DFF81-87C5-42FE-88FC-CF45597073D0}" destId="{01FFF8B0-CD1F-4F53-AB7E-29B6C948A2B1}" srcOrd="1" destOrd="0" presId="urn:microsoft.com/office/officeart/2005/8/layout/list1"/>
+    <dgm:cxn modelId="{DF638EE7-73C4-408C-9C6A-EE698F620815}" type="presOf" srcId="{08AB1BFE-2FF8-4E08-AB67-659848F1B8CA}" destId="{EEA3F2AE-3F24-489D-83E3-7F4B06DD9765}" srcOrd="1" destOrd="0" presId="urn:microsoft.com/office/officeart/2005/8/layout/list1"/>
     <dgm:cxn modelId="{F99E2F40-9DC0-4235-B3C4-F3E2B756E8B0}" srcId="{AF8F3852-418C-4CCA-9422-5CA21CCE84D6}" destId="{2441D3CF-DCAD-4AA1-9DCB-7DCE65E9CFB0}" srcOrd="0" destOrd="0" parTransId="{2394ED3E-B039-4CB3-9DEF-7F05460399CE}" sibTransId="{769B4220-6623-410B-8B5E-311E4FAB44D4}"/>
-    <dgm:cxn modelId="{705A3C40-184D-4F58-8EE4-A43D0268E02D}" type="presOf" srcId="{AF8F3852-418C-4CCA-9422-5CA21CCE84D6}" destId="{F689F3C3-4244-4335-A2AD-354FE4F53E7F}" srcOrd="0" destOrd="0" presId="urn:microsoft.com/office/officeart/2005/8/layout/list1"/>
-    <dgm:cxn modelId="{A2248066-0C5F-4CE2-B655-6D5F0E756B7F}" type="presOf" srcId="{961DFF81-87C5-42FE-88FC-CF45597073D0}" destId="{01FFF8B0-CD1F-4F53-AB7E-29B6C948A2B1}" srcOrd="1" destOrd="0" presId="urn:microsoft.com/office/officeart/2005/8/layout/list1"/>
-    <dgm:cxn modelId="{BE85F947-A8BA-47CC-98BF-9F89A119843D}" type="presOf" srcId="{1E7F9215-8D51-418C-BCB9-5121F3DAB11F}" destId="{4CF1124C-A0ED-4056-9201-ABEC2856F27D}" srcOrd="0" destOrd="0" presId="urn:microsoft.com/office/officeart/2005/8/layout/list1"/>
-    <dgm:cxn modelId="{9083D76D-BE5D-4B5B-A340-D5FCE7960F2D}" type="presOf" srcId="{449737C4-5008-4883-9D35-B50B9E1D0365}" destId="{9A752E06-C8C7-4635-B74A-8F490BC7913E}" srcOrd="0" destOrd="0" presId="urn:microsoft.com/office/officeart/2005/8/layout/list1"/>
-    <dgm:cxn modelId="{A790524F-9E6A-49B3-A5B6-6881AFCCDD21}" type="presOf" srcId="{E11C88C8-59F0-40F5-A714-56F6F8B84CD6}" destId="{551048E4-398F-4C1E-9441-821EADDCAB01}" srcOrd="0" destOrd="0" presId="urn:microsoft.com/office/officeart/2005/8/layout/list1"/>
-    <dgm:cxn modelId="{37060273-8046-46E3-AE02-6101C7B25F4D}" srcId="{AF8F3852-418C-4CCA-9422-5CA21CCE84D6}" destId="{08AB1BFE-2FF8-4E08-AB67-659848F1B8CA}" srcOrd="2" destOrd="0" parTransId="{071D4CA8-A1C5-4C39-A38E-9F2A0A24ECF1}" sibTransId="{5429D7E4-5EF3-43E8-806A-B16531DF679F}"/>
-    <dgm:cxn modelId="{EC771F56-D8AF-4610-A493-6CF1DC2BA72C}" srcId="{AF8F3852-418C-4CCA-9422-5CA21CCE84D6}" destId="{449737C4-5008-4883-9D35-B50B9E1D0365}" srcOrd="1" destOrd="0" parTransId="{AB8E9C9B-2F55-462D-96BA-F7E756FFC44F}" sibTransId="{F41FC8E8-932C-4C4E-BCCB-049D4B725DF2}"/>
-    <dgm:cxn modelId="{5994E697-22FB-4F38-BCE7-E1795E4C4F69}" type="presOf" srcId="{1E7F9215-8D51-418C-BCB9-5121F3DAB11F}" destId="{E9492916-5894-48C9-8838-772B00FD07E4}" srcOrd="1" destOrd="0" presId="urn:microsoft.com/office/officeart/2005/8/layout/list1"/>
-    <dgm:cxn modelId="{35CF7BA5-9923-478D-A406-8D8F734D69D9}" type="presOf" srcId="{C94F9B29-0176-4B32-946A-81F36987B77C}" destId="{9ED2A6DE-E1F0-4B97-A932-C624D7625319}" srcOrd="0" destOrd="0" presId="urn:microsoft.com/office/officeart/2005/8/layout/list1"/>
-    <dgm:cxn modelId="{D5ADA4B5-035D-40EC-B510-ED7D74C2C719}" type="presOf" srcId="{2441D3CF-DCAD-4AA1-9DCB-7DCE65E9CFB0}" destId="{9BBD5306-58FE-433D-8C13-5D167B921D81}" srcOrd="0" destOrd="0" presId="urn:microsoft.com/office/officeart/2005/8/layout/list1"/>
-    <dgm:cxn modelId="{433CB0E2-E910-4DFA-A83F-B3A3DC6ED55D}" type="presOf" srcId="{449737C4-5008-4883-9D35-B50B9E1D0365}" destId="{E6021B6F-4BF1-49F7-9BAA-7A50081B6E91}" srcOrd="1" destOrd="0" presId="urn:microsoft.com/office/officeart/2005/8/layout/list1"/>
-    <dgm:cxn modelId="{DF638EE7-73C4-408C-9C6A-EE698F620815}" type="presOf" srcId="{08AB1BFE-2FF8-4E08-AB67-659848F1B8CA}" destId="{EEA3F2AE-3F24-489D-83E3-7F4B06DD9765}" srcOrd="1" destOrd="0" presId="urn:microsoft.com/office/officeart/2005/8/layout/list1"/>
-    <dgm:cxn modelId="{66CDDAF3-1987-42E2-A532-87B360C04E6E}" type="presOf" srcId="{E11C88C8-59F0-40F5-A714-56F6F8B84CD6}" destId="{ACFE3EAD-6DAF-4414-ADCE-CEFF338717F4}" srcOrd="1" destOrd="0" presId="urn:microsoft.com/office/officeart/2005/8/layout/list1"/>
-    <dgm:cxn modelId="{050FAAF6-88BF-43C4-B57E-94FD85AD993B}" type="presOf" srcId="{C94F9B29-0176-4B32-946A-81F36987B77C}" destId="{44BA7E45-6568-4082-BD0C-21BF64E58C92}" srcOrd="1" destOrd="0" presId="urn:microsoft.com/office/officeart/2005/8/layout/list1"/>
-    <dgm:cxn modelId="{03E3A3FE-CCCB-4168-BC16-5AB654C45D50}" srcId="{AF8F3852-418C-4CCA-9422-5CA21CCE84D6}" destId="{961DFF81-87C5-42FE-88FC-CF45597073D0}" srcOrd="4" destOrd="0" parTransId="{68B155CE-839B-478C-9B8F-F62DB7696E3D}" sibTransId="{9B883FEB-34F4-460F-9CDB-3BC0D8AC5176}"/>
     <dgm:cxn modelId="{E44947CB-91DC-473B-B869-237C212E08BB}" type="presParOf" srcId="{F689F3C3-4244-4335-A2AD-354FE4F53E7F}" destId="{4503D6D9-EE76-45CF-92D0-F48C86A714E3}" srcOrd="0" destOrd="0" presId="urn:microsoft.com/office/officeart/2005/8/layout/list1"/>
     <dgm:cxn modelId="{DF392413-7204-4AE9-A8E6-1F7085BC6F6D}" type="presParOf" srcId="{4503D6D9-EE76-45CF-92D0-F48C86A714E3}" destId="{9BBD5306-58FE-433D-8C13-5D167B921D81}" srcOrd="0" destOrd="0" presId="urn:microsoft.com/office/officeart/2005/8/layout/list1"/>
     <dgm:cxn modelId="{25A056AC-C383-4218-8F83-B1C54083DDF0}" type="presParOf" srcId="{4503D6D9-EE76-45CF-92D0-F48C86A714E3}" destId="{9EB2B872-AF6A-4097-9DC5-DA51AA82E595}" srcOrd="1" destOrd="0" presId="urn:microsoft.com/office/officeart/2005/8/layout/list1"/>
@@ -1705,7 +1810,7 @@
         </a:bodyPr>
         <a:lstStyle/>
         <a:p>
-          <a:pPr marL="0" lvl="0" indent="0" algn="l" defTabSz="755650">
+          <a:pPr lvl="0" algn="l" defTabSz="755650">
             <a:lnSpc>
               <a:spcPct val="90000"/>
             </a:lnSpc>
@@ -1715,7 +1820,6 @@
             <a:spcAft>
               <a:spcPct val="35000"/>
             </a:spcAft>
-            <a:buNone/>
           </a:pPr>
           <a:r>
             <a:rPr lang="en-US" sz="1700" kern="1200" dirty="0">
@@ -1863,7 +1967,7 @@
         </a:bodyPr>
         <a:lstStyle/>
         <a:p>
-          <a:pPr marL="0" lvl="0" indent="0" algn="l" defTabSz="755650">
+          <a:pPr lvl="0" algn="l" defTabSz="755650">
             <a:lnSpc>
               <a:spcPct val="90000"/>
             </a:lnSpc>
@@ -1873,7 +1977,6 @@
             <a:spcAft>
               <a:spcPct val="35000"/>
             </a:spcAft>
-            <a:buNone/>
           </a:pPr>
           <a:r>
             <a:rPr lang="en-US" sz="1700" kern="1200" dirty="0">
@@ -2021,7 +2124,7 @@
         </a:bodyPr>
         <a:lstStyle/>
         <a:p>
-          <a:pPr marL="0" lvl="0" indent="0" algn="l" defTabSz="755650">
+          <a:pPr lvl="0" algn="l" defTabSz="755650">
             <a:lnSpc>
               <a:spcPct val="90000"/>
             </a:lnSpc>
@@ -2031,7 +2134,6 @@
             <a:spcAft>
               <a:spcPct val="35000"/>
             </a:spcAft>
-            <a:buNone/>
           </a:pPr>
           <a:r>
             <a:rPr lang="en-US" sz="1700" kern="1200" dirty="0">
@@ -2179,7 +2281,7 @@
         </a:bodyPr>
         <a:lstStyle/>
         <a:p>
-          <a:pPr marL="0" lvl="0" indent="0" algn="l" defTabSz="755650">
+          <a:pPr lvl="0" algn="l" defTabSz="755650">
             <a:lnSpc>
               <a:spcPct val="90000"/>
             </a:lnSpc>
@@ -2189,7 +2291,6 @@
             <a:spcAft>
               <a:spcPct val="35000"/>
             </a:spcAft>
-            <a:buNone/>
           </a:pPr>
           <a:r>
             <a:rPr lang="en-US" sz="1700" kern="1200" dirty="0">
@@ -2337,7 +2438,7 @@
         </a:bodyPr>
         <a:lstStyle/>
         <a:p>
-          <a:pPr marL="0" lvl="0" indent="0" algn="l" defTabSz="755650">
+          <a:pPr lvl="0" algn="l" defTabSz="755650">
             <a:lnSpc>
               <a:spcPct val="90000"/>
             </a:lnSpc>
@@ -2347,7 +2448,6 @@
             <a:spcAft>
               <a:spcPct val="35000"/>
             </a:spcAft>
-            <a:buNone/>
           </a:pPr>
           <a:r>
             <a:rPr lang="en-US" sz="1700" kern="1200" dirty="0">
@@ -2495,7 +2595,7 @@
         </a:bodyPr>
         <a:lstStyle/>
         <a:p>
-          <a:pPr marL="0" lvl="0" indent="0" algn="l" defTabSz="755650">
+          <a:pPr lvl="0" algn="l" defTabSz="755650">
             <a:lnSpc>
               <a:spcPct val="90000"/>
             </a:lnSpc>
@@ -2505,7 +2605,6 @@
             <a:spcAft>
               <a:spcPct val="35000"/>
             </a:spcAft>
-            <a:buNone/>
           </a:pPr>
           <a:r>
             <a:rPr lang="en-US" sz="1700" kern="1200" dirty="0">
@@ -2653,7 +2752,7 @@
         </a:bodyPr>
         <a:lstStyle/>
         <a:p>
-          <a:pPr marL="0" lvl="0" indent="0" algn="l" defTabSz="755650">
+          <a:pPr lvl="0" algn="l" defTabSz="755650">
             <a:lnSpc>
               <a:spcPct val="90000"/>
             </a:lnSpc>
@@ -2663,7 +2762,6 @@
             <a:spcAft>
               <a:spcPct val="35000"/>
             </a:spcAft>
-            <a:buNone/>
           </a:pPr>
           <a:r>
             <a:rPr lang="en-US" sz="1700" kern="1200" dirty="0">
@@ -4050,7 +4148,7 @@
           <a:p>
             <a:fld id="{017DFC51-A8C1-7447-B5BE-94CEAEDB02F7}" type="datetimeFigureOut">
               <a:rPr lang="en-US" smtClean="0"/>
-              <a:t>8/18/2017</a:t>
+              <a:t>9/7/17</a:t>
             </a:fld>
             <a:endParaRPr lang="en-US"/>
           </a:p>
@@ -4339,7 +4437,7 @@
           <p:cNvPr id="2" name="Title 1">
             <a:extLst>
               <a:ext uri="{FF2B5EF4-FFF2-40B4-BE49-F238E27FC236}">
-                <a16:creationId xmlns:a16="http://schemas.microsoft.com/office/drawing/2014/main" id="{3A2B6B2C-1D17-48F7-9588-D8253D28D65C}"/>
+                <a16:creationId xmlns:a16="http://schemas.microsoft.com/office/drawing/2014/main" xmlns="" id="{3A2B6B2C-1D17-48F7-9588-D8253D28D65C}"/>
               </a:ext>
             </a:extLst>
           </p:cNvPr>
@@ -4376,7 +4474,7 @@
           <p:cNvPr id="3" name="Subtitle 2">
             <a:extLst>
               <a:ext uri="{FF2B5EF4-FFF2-40B4-BE49-F238E27FC236}">
-                <a16:creationId xmlns:a16="http://schemas.microsoft.com/office/drawing/2014/main" id="{F56EADDD-C4C5-4831-8A76-6AFE4AA6B366}"/>
+                <a16:creationId xmlns:a16="http://schemas.microsoft.com/office/drawing/2014/main" xmlns="" id="{F56EADDD-C4C5-4831-8A76-6AFE4AA6B366}"/>
               </a:ext>
             </a:extLst>
           </p:cNvPr>
@@ -4446,7 +4544,7 @@
           <p:cNvPr id="4" name="Date Placeholder 3">
             <a:extLst>
               <a:ext uri="{FF2B5EF4-FFF2-40B4-BE49-F238E27FC236}">
-                <a16:creationId xmlns:a16="http://schemas.microsoft.com/office/drawing/2014/main" id="{9BDDCC26-1CDB-4005-A635-25EA672E5C7E}"/>
+                <a16:creationId xmlns:a16="http://schemas.microsoft.com/office/drawing/2014/main" xmlns="" id="{9BDDCC26-1CDB-4005-A635-25EA672E5C7E}"/>
               </a:ext>
             </a:extLst>
           </p:cNvPr>
@@ -4464,7 +4562,7 @@
           <a:p>
             <a:fld id="{1CAA113C-363C-4F92-BD24-C90ADEC9C5C9}" type="datetime1">
               <a:rPr lang="en-US" smtClean="0"/>
-              <a:t>8/18/2017</a:t>
+              <a:t>9/7/17</a:t>
             </a:fld>
             <a:endParaRPr lang="en-US"/>
           </a:p>
@@ -4475,7 +4573,7 @@
           <p:cNvPr id="5" name="Footer Placeholder 4">
             <a:extLst>
               <a:ext uri="{FF2B5EF4-FFF2-40B4-BE49-F238E27FC236}">
-                <a16:creationId xmlns:a16="http://schemas.microsoft.com/office/drawing/2014/main" id="{856DBDEA-58DA-418E-99A2-997EBB7F90C3}"/>
+                <a16:creationId xmlns:a16="http://schemas.microsoft.com/office/drawing/2014/main" xmlns="" id="{856DBDEA-58DA-418E-99A2-997EBB7F90C3}"/>
               </a:ext>
             </a:extLst>
           </p:cNvPr>
@@ -4503,7 +4601,7 @@
           <p:cNvPr id="6" name="Slide Number Placeholder 5">
             <a:extLst>
               <a:ext uri="{FF2B5EF4-FFF2-40B4-BE49-F238E27FC236}">
-                <a16:creationId xmlns:a16="http://schemas.microsoft.com/office/drawing/2014/main" id="{C43D24C8-14C8-41FA-9B8B-9569B19E1E1B}"/>
+                <a16:creationId xmlns:a16="http://schemas.microsoft.com/office/drawing/2014/main" xmlns="" id="{C43D24C8-14C8-41FA-9B8B-9569B19E1E1B}"/>
               </a:ext>
             </a:extLst>
           </p:cNvPr>
@@ -4562,7 +4660,7 @@
           <p:cNvPr id="2" name="Title 1">
             <a:extLst>
               <a:ext uri="{FF2B5EF4-FFF2-40B4-BE49-F238E27FC236}">
-                <a16:creationId xmlns:a16="http://schemas.microsoft.com/office/drawing/2014/main" id="{B4F1525D-4C43-4DE4-9FF5-9BB13BAEC8D2}"/>
+                <a16:creationId xmlns:a16="http://schemas.microsoft.com/office/drawing/2014/main" xmlns="" id="{B4F1525D-4C43-4DE4-9FF5-9BB13BAEC8D2}"/>
               </a:ext>
             </a:extLst>
           </p:cNvPr>
@@ -4590,7 +4688,7 @@
           <p:cNvPr id="3" name="Vertical Text Placeholder 2">
             <a:extLst>
               <a:ext uri="{FF2B5EF4-FFF2-40B4-BE49-F238E27FC236}">
-                <a16:creationId xmlns:a16="http://schemas.microsoft.com/office/drawing/2014/main" id="{0533AD3F-10DB-4EE7-8F3F-E542AC3D8640}"/>
+                <a16:creationId xmlns:a16="http://schemas.microsoft.com/office/drawing/2014/main" xmlns="" id="{0533AD3F-10DB-4EE7-8F3F-E542AC3D8640}"/>
               </a:ext>
             </a:extLst>
           </p:cNvPr>
@@ -4647,7 +4745,7 @@
           <p:cNvPr id="4" name="Date Placeholder 3">
             <a:extLst>
               <a:ext uri="{FF2B5EF4-FFF2-40B4-BE49-F238E27FC236}">
-                <a16:creationId xmlns:a16="http://schemas.microsoft.com/office/drawing/2014/main" id="{E9DFA2F4-BC75-4DAD-A022-F07B8E76EC12}"/>
+                <a16:creationId xmlns:a16="http://schemas.microsoft.com/office/drawing/2014/main" xmlns="" id="{E9DFA2F4-BC75-4DAD-A022-F07B8E76EC12}"/>
               </a:ext>
             </a:extLst>
           </p:cNvPr>
@@ -4665,7 +4763,7 @@
           <a:p>
             <a:fld id="{FCE3DC7A-9440-492F-8147-F61EC4AE7673}" type="datetime1">
               <a:rPr lang="en-US" smtClean="0"/>
-              <a:t>8/18/2017</a:t>
+              <a:t>9/7/17</a:t>
             </a:fld>
             <a:endParaRPr lang="en-US"/>
           </a:p>
@@ -4676,7 +4774,7 @@
           <p:cNvPr id="5" name="Footer Placeholder 4">
             <a:extLst>
               <a:ext uri="{FF2B5EF4-FFF2-40B4-BE49-F238E27FC236}">
-                <a16:creationId xmlns:a16="http://schemas.microsoft.com/office/drawing/2014/main" id="{32EE42F8-78CF-40C8-AB5F-97329201F5AC}"/>
+                <a16:creationId xmlns:a16="http://schemas.microsoft.com/office/drawing/2014/main" xmlns="" id="{32EE42F8-78CF-40C8-AB5F-97329201F5AC}"/>
               </a:ext>
             </a:extLst>
           </p:cNvPr>
@@ -4704,7 +4802,7 @@
           <p:cNvPr id="6" name="Slide Number Placeholder 5">
             <a:extLst>
               <a:ext uri="{FF2B5EF4-FFF2-40B4-BE49-F238E27FC236}">
-                <a16:creationId xmlns:a16="http://schemas.microsoft.com/office/drawing/2014/main" id="{E75D49E7-542F-459F-B3D8-C344AC26350F}"/>
+                <a16:creationId xmlns:a16="http://schemas.microsoft.com/office/drawing/2014/main" xmlns="" id="{E75D49E7-542F-459F-B3D8-C344AC26350F}"/>
               </a:ext>
             </a:extLst>
           </p:cNvPr>
@@ -4763,7 +4861,7 @@
           <p:cNvPr id="2" name="Vertical Title 1">
             <a:extLst>
               <a:ext uri="{FF2B5EF4-FFF2-40B4-BE49-F238E27FC236}">
-                <a16:creationId xmlns:a16="http://schemas.microsoft.com/office/drawing/2014/main" id="{61B5EE6B-D9C9-4D10-9833-A1B85AC12332}"/>
+                <a16:creationId xmlns:a16="http://schemas.microsoft.com/office/drawing/2014/main" xmlns="" id="{61B5EE6B-D9C9-4D10-9833-A1B85AC12332}"/>
               </a:ext>
             </a:extLst>
           </p:cNvPr>
@@ -4796,7 +4894,7 @@
           <p:cNvPr id="3" name="Vertical Text Placeholder 2">
             <a:extLst>
               <a:ext uri="{FF2B5EF4-FFF2-40B4-BE49-F238E27FC236}">
-                <a16:creationId xmlns:a16="http://schemas.microsoft.com/office/drawing/2014/main" id="{5FE98486-E659-497F-B162-9B83E6C8CA48}"/>
+                <a16:creationId xmlns:a16="http://schemas.microsoft.com/office/drawing/2014/main" xmlns="" id="{5FE98486-E659-497F-B162-9B83E6C8CA48}"/>
               </a:ext>
             </a:extLst>
           </p:cNvPr>
@@ -4858,7 +4956,7 @@
           <p:cNvPr id="4" name="Date Placeholder 3">
             <a:extLst>
               <a:ext uri="{FF2B5EF4-FFF2-40B4-BE49-F238E27FC236}">
-                <a16:creationId xmlns:a16="http://schemas.microsoft.com/office/drawing/2014/main" id="{C6F1836C-BA58-4BF3-9FDF-83F39BCB2EF5}"/>
+                <a16:creationId xmlns:a16="http://schemas.microsoft.com/office/drawing/2014/main" xmlns="" id="{C6F1836C-BA58-4BF3-9FDF-83F39BCB2EF5}"/>
               </a:ext>
             </a:extLst>
           </p:cNvPr>
@@ -4876,7 +4974,7 @@
           <a:p>
             <a:fld id="{769E20EB-1BF5-49B0-BEEF-DC2AEACD184A}" type="datetime1">
               <a:rPr lang="en-US" smtClean="0"/>
-              <a:t>8/18/2017</a:t>
+              <a:t>9/7/17</a:t>
             </a:fld>
             <a:endParaRPr lang="en-US"/>
           </a:p>
@@ -4887,7 +4985,7 @@
           <p:cNvPr id="5" name="Footer Placeholder 4">
             <a:extLst>
               <a:ext uri="{FF2B5EF4-FFF2-40B4-BE49-F238E27FC236}">
-                <a16:creationId xmlns:a16="http://schemas.microsoft.com/office/drawing/2014/main" id="{2B38586F-AC08-4C53-AF72-BEEC914903F2}"/>
+                <a16:creationId xmlns:a16="http://schemas.microsoft.com/office/drawing/2014/main" xmlns="" id="{2B38586F-AC08-4C53-AF72-BEEC914903F2}"/>
               </a:ext>
             </a:extLst>
           </p:cNvPr>
@@ -4915,7 +5013,7 @@
           <p:cNvPr id="6" name="Slide Number Placeholder 5">
             <a:extLst>
               <a:ext uri="{FF2B5EF4-FFF2-40B4-BE49-F238E27FC236}">
-                <a16:creationId xmlns:a16="http://schemas.microsoft.com/office/drawing/2014/main" id="{A570E472-2A0D-4943-9BF8-2E963DD1666E}"/>
+                <a16:creationId xmlns:a16="http://schemas.microsoft.com/office/drawing/2014/main" xmlns="" id="{A570E472-2A0D-4943-9BF8-2E963DD1666E}"/>
               </a:ext>
             </a:extLst>
           </p:cNvPr>
@@ -4974,7 +5072,7 @@
           <p:cNvPr id="2" name="Title 1">
             <a:extLst>
               <a:ext uri="{FF2B5EF4-FFF2-40B4-BE49-F238E27FC236}">
-                <a16:creationId xmlns:a16="http://schemas.microsoft.com/office/drawing/2014/main" id="{43446509-7BA3-47EE-B42D-7474C055EBA3}"/>
+                <a16:creationId xmlns:a16="http://schemas.microsoft.com/office/drawing/2014/main" xmlns="" id="{43446509-7BA3-47EE-B42D-7474C055EBA3}"/>
               </a:ext>
             </a:extLst>
           </p:cNvPr>
@@ -5002,7 +5100,7 @@
           <p:cNvPr id="3" name="Content Placeholder 2">
             <a:extLst>
               <a:ext uri="{FF2B5EF4-FFF2-40B4-BE49-F238E27FC236}">
-                <a16:creationId xmlns:a16="http://schemas.microsoft.com/office/drawing/2014/main" id="{8B9C2007-7C97-4C0B-B7E7-7E62A135128A}"/>
+                <a16:creationId xmlns:a16="http://schemas.microsoft.com/office/drawing/2014/main" xmlns="" id="{8B9C2007-7C97-4C0B-B7E7-7E62A135128A}"/>
               </a:ext>
             </a:extLst>
           </p:cNvPr>
@@ -5059,7 +5157,7 @@
           <p:cNvPr id="4" name="Date Placeholder 3">
             <a:extLst>
               <a:ext uri="{FF2B5EF4-FFF2-40B4-BE49-F238E27FC236}">
-                <a16:creationId xmlns:a16="http://schemas.microsoft.com/office/drawing/2014/main" id="{C24ACC64-5B59-4E5B-9020-5BB2316D9A5A}"/>
+                <a16:creationId xmlns:a16="http://schemas.microsoft.com/office/drawing/2014/main" xmlns="" id="{C24ACC64-5B59-4E5B-9020-5BB2316D9A5A}"/>
               </a:ext>
             </a:extLst>
           </p:cNvPr>
@@ -5077,7 +5175,7 @@
           <a:p>
             <a:fld id="{E618A332-E21D-404A-84C0-9185DC9569B4}" type="datetime1">
               <a:rPr lang="en-US" smtClean="0"/>
-              <a:t>8/18/2017</a:t>
+              <a:t>9/7/17</a:t>
             </a:fld>
             <a:endParaRPr lang="en-US"/>
           </a:p>
@@ -5088,7 +5186,7 @@
           <p:cNvPr id="5" name="Footer Placeholder 4">
             <a:extLst>
               <a:ext uri="{FF2B5EF4-FFF2-40B4-BE49-F238E27FC236}">
-                <a16:creationId xmlns:a16="http://schemas.microsoft.com/office/drawing/2014/main" id="{C19F0E2B-A5E9-419A-8A58-F63B2FE384BE}"/>
+                <a16:creationId xmlns:a16="http://schemas.microsoft.com/office/drawing/2014/main" xmlns="" id="{C19F0E2B-A5E9-419A-8A58-F63B2FE384BE}"/>
               </a:ext>
             </a:extLst>
           </p:cNvPr>
@@ -5116,7 +5214,7 @@
           <p:cNvPr id="6" name="Slide Number Placeholder 5">
             <a:extLst>
               <a:ext uri="{FF2B5EF4-FFF2-40B4-BE49-F238E27FC236}">
-                <a16:creationId xmlns:a16="http://schemas.microsoft.com/office/drawing/2014/main" id="{41442D13-201E-47CF-BFD2-56F69686410A}"/>
+                <a16:creationId xmlns:a16="http://schemas.microsoft.com/office/drawing/2014/main" xmlns="" id="{41442D13-201E-47CF-BFD2-56F69686410A}"/>
               </a:ext>
             </a:extLst>
           </p:cNvPr>
@@ -5175,7 +5273,7 @@
           <p:cNvPr id="2" name="Title 1">
             <a:extLst>
               <a:ext uri="{FF2B5EF4-FFF2-40B4-BE49-F238E27FC236}">
-                <a16:creationId xmlns:a16="http://schemas.microsoft.com/office/drawing/2014/main" id="{E00E2794-12DA-4715-B731-6B973BACA2D8}"/>
+                <a16:creationId xmlns:a16="http://schemas.microsoft.com/office/drawing/2014/main" xmlns="" id="{E00E2794-12DA-4715-B731-6B973BACA2D8}"/>
               </a:ext>
             </a:extLst>
           </p:cNvPr>
@@ -5212,7 +5310,7 @@
           <p:cNvPr id="3" name="Text Placeholder 2">
             <a:extLst>
               <a:ext uri="{FF2B5EF4-FFF2-40B4-BE49-F238E27FC236}">
-                <a16:creationId xmlns:a16="http://schemas.microsoft.com/office/drawing/2014/main" id="{D8392832-95DB-42A3-BD8C-F8544C9F1428}"/>
+                <a16:creationId xmlns:a16="http://schemas.microsoft.com/office/drawing/2014/main" xmlns="" id="{D8392832-95DB-42A3-BD8C-F8544C9F1428}"/>
               </a:ext>
             </a:extLst>
           </p:cNvPr>
@@ -5337,7 +5435,7 @@
           <p:cNvPr id="4" name="Date Placeholder 3">
             <a:extLst>
               <a:ext uri="{FF2B5EF4-FFF2-40B4-BE49-F238E27FC236}">
-                <a16:creationId xmlns:a16="http://schemas.microsoft.com/office/drawing/2014/main" id="{474F064E-A1C1-4C64-99C5-804D8EA2C258}"/>
+                <a16:creationId xmlns:a16="http://schemas.microsoft.com/office/drawing/2014/main" xmlns="" id="{474F064E-A1C1-4C64-99C5-804D8EA2C258}"/>
               </a:ext>
             </a:extLst>
           </p:cNvPr>
@@ -5355,7 +5453,7 @@
           <a:p>
             <a:fld id="{E1016D4E-1E0F-4F5E-A294-3C49A50A508F}" type="datetime1">
               <a:rPr lang="en-US" smtClean="0"/>
-              <a:t>8/18/2017</a:t>
+              <a:t>9/7/17</a:t>
             </a:fld>
             <a:endParaRPr lang="en-US"/>
           </a:p>
@@ -5366,7 +5464,7 @@
           <p:cNvPr id="5" name="Footer Placeholder 4">
             <a:extLst>
               <a:ext uri="{FF2B5EF4-FFF2-40B4-BE49-F238E27FC236}">
-                <a16:creationId xmlns:a16="http://schemas.microsoft.com/office/drawing/2014/main" id="{C6350B9C-1845-4415-A45F-9C2D6BADFDD0}"/>
+                <a16:creationId xmlns:a16="http://schemas.microsoft.com/office/drawing/2014/main" xmlns="" id="{C6350B9C-1845-4415-A45F-9C2D6BADFDD0}"/>
               </a:ext>
             </a:extLst>
           </p:cNvPr>
@@ -5394,7 +5492,7 @@
           <p:cNvPr id="6" name="Slide Number Placeholder 5">
             <a:extLst>
               <a:ext uri="{FF2B5EF4-FFF2-40B4-BE49-F238E27FC236}">
-                <a16:creationId xmlns:a16="http://schemas.microsoft.com/office/drawing/2014/main" id="{476903AE-7732-4FD2-8395-14F899D7A66F}"/>
+                <a16:creationId xmlns:a16="http://schemas.microsoft.com/office/drawing/2014/main" xmlns="" id="{476903AE-7732-4FD2-8395-14F899D7A66F}"/>
               </a:ext>
             </a:extLst>
           </p:cNvPr>
@@ -5453,7 +5551,7 @@
           <p:cNvPr id="2" name="Title 1">
             <a:extLst>
               <a:ext uri="{FF2B5EF4-FFF2-40B4-BE49-F238E27FC236}">
-                <a16:creationId xmlns:a16="http://schemas.microsoft.com/office/drawing/2014/main" id="{71379085-CB35-4406-91D5-DCDFDB3602C3}"/>
+                <a16:creationId xmlns:a16="http://schemas.microsoft.com/office/drawing/2014/main" xmlns="" id="{71379085-CB35-4406-91D5-DCDFDB3602C3}"/>
               </a:ext>
             </a:extLst>
           </p:cNvPr>
@@ -5481,7 +5579,7 @@
           <p:cNvPr id="3" name="Content Placeholder 2">
             <a:extLst>
               <a:ext uri="{FF2B5EF4-FFF2-40B4-BE49-F238E27FC236}">
-                <a16:creationId xmlns:a16="http://schemas.microsoft.com/office/drawing/2014/main" id="{335C5B53-F9FF-48A0-B85C-90C3A2BBEA35}"/>
+                <a16:creationId xmlns:a16="http://schemas.microsoft.com/office/drawing/2014/main" xmlns="" id="{335C5B53-F9FF-48A0-B85C-90C3A2BBEA35}"/>
               </a:ext>
             </a:extLst>
           </p:cNvPr>
@@ -5543,7 +5641,7 @@
           <p:cNvPr id="4" name="Content Placeholder 3">
             <a:extLst>
               <a:ext uri="{FF2B5EF4-FFF2-40B4-BE49-F238E27FC236}">
-                <a16:creationId xmlns:a16="http://schemas.microsoft.com/office/drawing/2014/main" id="{164A39C1-042D-4841-AFF9-9E94106D3EBE}"/>
+                <a16:creationId xmlns:a16="http://schemas.microsoft.com/office/drawing/2014/main" xmlns="" id="{164A39C1-042D-4841-AFF9-9E94106D3EBE}"/>
               </a:ext>
             </a:extLst>
           </p:cNvPr>
@@ -5605,7 +5703,7 @@
           <p:cNvPr id="5" name="Date Placeholder 4">
             <a:extLst>
               <a:ext uri="{FF2B5EF4-FFF2-40B4-BE49-F238E27FC236}">
-                <a16:creationId xmlns:a16="http://schemas.microsoft.com/office/drawing/2014/main" id="{B19BE6F0-C34A-4320-9276-1FB522896457}"/>
+                <a16:creationId xmlns:a16="http://schemas.microsoft.com/office/drawing/2014/main" xmlns="" id="{B19BE6F0-C34A-4320-9276-1FB522896457}"/>
               </a:ext>
             </a:extLst>
           </p:cNvPr>
@@ -5623,7 +5721,7 @@
           <a:p>
             <a:fld id="{2BCE1DF8-55A9-4893-87BC-2EA8EF9F2AA7}" type="datetime1">
               <a:rPr lang="en-US" smtClean="0"/>
-              <a:t>8/18/2017</a:t>
+              <a:t>9/7/17</a:t>
             </a:fld>
             <a:endParaRPr lang="en-US"/>
           </a:p>
@@ -5634,7 +5732,7 @@
           <p:cNvPr id="6" name="Footer Placeholder 5">
             <a:extLst>
               <a:ext uri="{FF2B5EF4-FFF2-40B4-BE49-F238E27FC236}">
-                <a16:creationId xmlns:a16="http://schemas.microsoft.com/office/drawing/2014/main" id="{3BC79A0B-5490-4284-BADE-4FC77A4A4469}"/>
+                <a16:creationId xmlns:a16="http://schemas.microsoft.com/office/drawing/2014/main" xmlns="" id="{3BC79A0B-5490-4284-BADE-4FC77A4A4469}"/>
               </a:ext>
             </a:extLst>
           </p:cNvPr>
@@ -5662,7 +5760,7 @@
           <p:cNvPr id="7" name="Slide Number Placeholder 6">
             <a:extLst>
               <a:ext uri="{FF2B5EF4-FFF2-40B4-BE49-F238E27FC236}">
-                <a16:creationId xmlns:a16="http://schemas.microsoft.com/office/drawing/2014/main" id="{45EEF3BB-41E9-4A64-8086-5FB22B1960F5}"/>
+                <a16:creationId xmlns:a16="http://schemas.microsoft.com/office/drawing/2014/main" xmlns="" id="{45EEF3BB-41E9-4A64-8086-5FB22B1960F5}"/>
               </a:ext>
             </a:extLst>
           </p:cNvPr>
@@ -5721,7 +5819,7 @@
           <p:cNvPr id="2" name="Title 1">
             <a:extLst>
               <a:ext uri="{FF2B5EF4-FFF2-40B4-BE49-F238E27FC236}">
-                <a16:creationId xmlns:a16="http://schemas.microsoft.com/office/drawing/2014/main" id="{A00DDAB0-C356-4D73-A780-600C66F38211}"/>
+                <a16:creationId xmlns:a16="http://schemas.microsoft.com/office/drawing/2014/main" xmlns="" id="{A00DDAB0-C356-4D73-A780-600C66F38211}"/>
               </a:ext>
             </a:extLst>
           </p:cNvPr>
@@ -5754,7 +5852,7 @@
           <p:cNvPr id="3" name="Text Placeholder 2">
             <a:extLst>
               <a:ext uri="{FF2B5EF4-FFF2-40B4-BE49-F238E27FC236}">
-                <a16:creationId xmlns:a16="http://schemas.microsoft.com/office/drawing/2014/main" id="{EC20F3DD-0341-43C8-814A-9F30F25C3C0E}"/>
+                <a16:creationId xmlns:a16="http://schemas.microsoft.com/office/drawing/2014/main" xmlns="" id="{EC20F3DD-0341-43C8-814A-9F30F25C3C0E}"/>
               </a:ext>
             </a:extLst>
           </p:cNvPr>
@@ -5825,7 +5923,7 @@
           <p:cNvPr id="4" name="Content Placeholder 3">
             <a:extLst>
               <a:ext uri="{FF2B5EF4-FFF2-40B4-BE49-F238E27FC236}">
-                <a16:creationId xmlns:a16="http://schemas.microsoft.com/office/drawing/2014/main" id="{F517663E-B0AF-4C58-A3C8-4D262F4CE4D9}"/>
+                <a16:creationId xmlns:a16="http://schemas.microsoft.com/office/drawing/2014/main" xmlns="" id="{F517663E-B0AF-4C58-A3C8-4D262F4CE4D9}"/>
               </a:ext>
             </a:extLst>
           </p:cNvPr>
@@ -5887,7 +5985,7 @@
           <p:cNvPr id="5" name="Text Placeholder 4">
             <a:extLst>
               <a:ext uri="{FF2B5EF4-FFF2-40B4-BE49-F238E27FC236}">
-                <a16:creationId xmlns:a16="http://schemas.microsoft.com/office/drawing/2014/main" id="{E2D943A4-230B-4379-88C8-DCCA780F165C}"/>
+                <a16:creationId xmlns:a16="http://schemas.microsoft.com/office/drawing/2014/main" xmlns="" id="{E2D943A4-230B-4379-88C8-DCCA780F165C}"/>
               </a:ext>
             </a:extLst>
           </p:cNvPr>
@@ -5958,7 +6056,7 @@
           <p:cNvPr id="6" name="Content Placeholder 5">
             <a:extLst>
               <a:ext uri="{FF2B5EF4-FFF2-40B4-BE49-F238E27FC236}">
-                <a16:creationId xmlns:a16="http://schemas.microsoft.com/office/drawing/2014/main" id="{CDB5334F-2D67-44AA-8E58-72CDDB52E9E5}"/>
+                <a16:creationId xmlns:a16="http://schemas.microsoft.com/office/drawing/2014/main" xmlns="" id="{CDB5334F-2D67-44AA-8E58-72CDDB52E9E5}"/>
               </a:ext>
             </a:extLst>
           </p:cNvPr>
@@ -6020,7 +6118,7 @@
           <p:cNvPr id="7" name="Date Placeholder 6">
             <a:extLst>
               <a:ext uri="{FF2B5EF4-FFF2-40B4-BE49-F238E27FC236}">
-                <a16:creationId xmlns:a16="http://schemas.microsoft.com/office/drawing/2014/main" id="{FF986822-6FAC-4DB2-BFBE-04F3C69D0CA6}"/>
+                <a16:creationId xmlns:a16="http://schemas.microsoft.com/office/drawing/2014/main" xmlns="" id="{FF986822-6FAC-4DB2-BFBE-04F3C69D0CA6}"/>
               </a:ext>
             </a:extLst>
           </p:cNvPr>
@@ -6038,7 +6136,7 @@
           <a:p>
             <a:fld id="{5E16DA62-248D-4400-9766-202577B99E1B}" type="datetime1">
               <a:rPr lang="en-US" smtClean="0"/>
-              <a:t>8/18/2017</a:t>
+              <a:t>9/7/17</a:t>
             </a:fld>
             <a:endParaRPr lang="en-US"/>
           </a:p>
@@ -6049,7 +6147,7 @@
           <p:cNvPr id="8" name="Footer Placeholder 7">
             <a:extLst>
               <a:ext uri="{FF2B5EF4-FFF2-40B4-BE49-F238E27FC236}">
-                <a16:creationId xmlns:a16="http://schemas.microsoft.com/office/drawing/2014/main" id="{52C4C7EC-5083-4774-9D0B-1D063F0C7670}"/>
+                <a16:creationId xmlns:a16="http://schemas.microsoft.com/office/drawing/2014/main" xmlns="" id="{52C4C7EC-5083-4774-9D0B-1D063F0C7670}"/>
               </a:ext>
             </a:extLst>
           </p:cNvPr>
@@ -6077,7 +6175,7 @@
           <p:cNvPr id="9" name="Slide Number Placeholder 8">
             <a:extLst>
               <a:ext uri="{FF2B5EF4-FFF2-40B4-BE49-F238E27FC236}">
-                <a16:creationId xmlns:a16="http://schemas.microsoft.com/office/drawing/2014/main" id="{1348B4C2-D971-414B-9D40-EBD9799AD00A}"/>
+                <a16:creationId xmlns:a16="http://schemas.microsoft.com/office/drawing/2014/main" xmlns="" id="{1348B4C2-D971-414B-9D40-EBD9799AD00A}"/>
               </a:ext>
             </a:extLst>
           </p:cNvPr>
@@ -6136,7 +6234,7 @@
           <p:cNvPr id="2" name="Title 1">
             <a:extLst>
               <a:ext uri="{FF2B5EF4-FFF2-40B4-BE49-F238E27FC236}">
-                <a16:creationId xmlns:a16="http://schemas.microsoft.com/office/drawing/2014/main" id="{7973B543-4AD4-4E9B-85BF-2E5454E53F05}"/>
+                <a16:creationId xmlns:a16="http://schemas.microsoft.com/office/drawing/2014/main" xmlns="" id="{7973B543-4AD4-4E9B-85BF-2E5454E53F05}"/>
               </a:ext>
             </a:extLst>
           </p:cNvPr>
@@ -6164,7 +6262,7 @@
           <p:cNvPr id="3" name="Date Placeholder 2">
             <a:extLst>
               <a:ext uri="{FF2B5EF4-FFF2-40B4-BE49-F238E27FC236}">
-                <a16:creationId xmlns:a16="http://schemas.microsoft.com/office/drawing/2014/main" id="{68CF37F4-A503-485D-BA61-77AA9A0BDA5A}"/>
+                <a16:creationId xmlns:a16="http://schemas.microsoft.com/office/drawing/2014/main" xmlns="" id="{68CF37F4-A503-485D-BA61-77AA9A0BDA5A}"/>
               </a:ext>
             </a:extLst>
           </p:cNvPr>
@@ -6182,7 +6280,7 @@
           <a:p>
             <a:fld id="{715397D6-9165-4B2F-BB17-9F02AC01BE5D}" type="datetime1">
               <a:rPr lang="en-US" smtClean="0"/>
-              <a:t>8/18/2017</a:t>
+              <a:t>9/7/17</a:t>
             </a:fld>
             <a:endParaRPr lang="en-US"/>
           </a:p>
@@ -6193,7 +6291,7 @@
           <p:cNvPr id="4" name="Footer Placeholder 3">
             <a:extLst>
               <a:ext uri="{FF2B5EF4-FFF2-40B4-BE49-F238E27FC236}">
-                <a16:creationId xmlns:a16="http://schemas.microsoft.com/office/drawing/2014/main" id="{E69CC442-F7FC-48B3-95A1-2F90595C8B4E}"/>
+                <a16:creationId xmlns:a16="http://schemas.microsoft.com/office/drawing/2014/main" xmlns="" id="{E69CC442-F7FC-48B3-95A1-2F90595C8B4E}"/>
               </a:ext>
             </a:extLst>
           </p:cNvPr>
@@ -6221,7 +6319,7 @@
           <p:cNvPr id="5" name="Slide Number Placeholder 4">
             <a:extLst>
               <a:ext uri="{FF2B5EF4-FFF2-40B4-BE49-F238E27FC236}">
-                <a16:creationId xmlns:a16="http://schemas.microsoft.com/office/drawing/2014/main" id="{89366554-0B77-4127-AFFD-F8F7B6865F29}"/>
+                <a16:creationId xmlns:a16="http://schemas.microsoft.com/office/drawing/2014/main" xmlns="" id="{89366554-0B77-4127-AFFD-F8F7B6865F29}"/>
               </a:ext>
             </a:extLst>
           </p:cNvPr>
@@ -6280,7 +6378,7 @@
           <p:cNvPr id="2" name="Date Placeholder 1">
             <a:extLst>
               <a:ext uri="{FF2B5EF4-FFF2-40B4-BE49-F238E27FC236}">
-                <a16:creationId xmlns:a16="http://schemas.microsoft.com/office/drawing/2014/main" id="{006B9298-75F6-4FE1-B46A-9C8CC48E4ADF}"/>
+                <a16:creationId xmlns:a16="http://schemas.microsoft.com/office/drawing/2014/main" xmlns="" id="{006B9298-75F6-4FE1-B46A-9C8CC48E4ADF}"/>
               </a:ext>
             </a:extLst>
           </p:cNvPr>
@@ -6298,7 +6396,7 @@
           <a:p>
             <a:fld id="{4B9A4E17-7207-4E47-AFD5-9A7592DC78C4}" type="datetime1">
               <a:rPr lang="en-US" smtClean="0"/>
-              <a:t>8/18/2017</a:t>
+              <a:t>9/7/17</a:t>
             </a:fld>
             <a:endParaRPr lang="en-US"/>
           </a:p>
@@ -6309,7 +6407,7 @@
           <p:cNvPr id="3" name="Footer Placeholder 2">
             <a:extLst>
               <a:ext uri="{FF2B5EF4-FFF2-40B4-BE49-F238E27FC236}">
-                <a16:creationId xmlns:a16="http://schemas.microsoft.com/office/drawing/2014/main" id="{4B776FCF-F399-4A35-A96A-438C5BD14B56}"/>
+                <a16:creationId xmlns:a16="http://schemas.microsoft.com/office/drawing/2014/main" xmlns="" id="{4B776FCF-F399-4A35-A96A-438C5BD14B56}"/>
               </a:ext>
             </a:extLst>
           </p:cNvPr>
@@ -6337,7 +6435,7 @@
           <p:cNvPr id="4" name="Slide Number Placeholder 3">
             <a:extLst>
               <a:ext uri="{FF2B5EF4-FFF2-40B4-BE49-F238E27FC236}">
-                <a16:creationId xmlns:a16="http://schemas.microsoft.com/office/drawing/2014/main" id="{AFDBDA98-B9C0-426B-AED5-86E4DFD5254D}"/>
+                <a16:creationId xmlns:a16="http://schemas.microsoft.com/office/drawing/2014/main" xmlns="" id="{AFDBDA98-B9C0-426B-AED5-86E4DFD5254D}"/>
               </a:ext>
             </a:extLst>
           </p:cNvPr>
@@ -6396,7 +6494,7 @@
           <p:cNvPr id="2" name="Title 1">
             <a:extLst>
               <a:ext uri="{FF2B5EF4-FFF2-40B4-BE49-F238E27FC236}">
-                <a16:creationId xmlns:a16="http://schemas.microsoft.com/office/drawing/2014/main" id="{4BB7ED92-F95D-45C9-BDBB-B34DEA405B96}"/>
+                <a16:creationId xmlns:a16="http://schemas.microsoft.com/office/drawing/2014/main" xmlns="" id="{4BB7ED92-F95D-45C9-BDBB-B34DEA405B96}"/>
               </a:ext>
             </a:extLst>
           </p:cNvPr>
@@ -6433,7 +6531,7 @@
           <p:cNvPr id="3" name="Content Placeholder 2">
             <a:extLst>
               <a:ext uri="{FF2B5EF4-FFF2-40B4-BE49-F238E27FC236}">
-                <a16:creationId xmlns:a16="http://schemas.microsoft.com/office/drawing/2014/main" id="{F0221168-7ADE-45CB-86EF-4C90A45C341F}"/>
+                <a16:creationId xmlns:a16="http://schemas.microsoft.com/office/drawing/2014/main" xmlns="" id="{F0221168-7ADE-45CB-86EF-4C90A45C341F}"/>
               </a:ext>
             </a:extLst>
           </p:cNvPr>
@@ -6523,7 +6621,7 @@
           <p:cNvPr id="4" name="Text Placeholder 3">
             <a:extLst>
               <a:ext uri="{FF2B5EF4-FFF2-40B4-BE49-F238E27FC236}">
-                <a16:creationId xmlns:a16="http://schemas.microsoft.com/office/drawing/2014/main" id="{BEFCD088-F1E9-49A2-BFAA-04528AD04DA7}"/>
+                <a16:creationId xmlns:a16="http://schemas.microsoft.com/office/drawing/2014/main" xmlns="" id="{BEFCD088-F1E9-49A2-BFAA-04528AD04DA7}"/>
               </a:ext>
             </a:extLst>
           </p:cNvPr>
@@ -6594,7 +6692,7 @@
           <p:cNvPr id="5" name="Date Placeholder 4">
             <a:extLst>
               <a:ext uri="{FF2B5EF4-FFF2-40B4-BE49-F238E27FC236}">
-                <a16:creationId xmlns:a16="http://schemas.microsoft.com/office/drawing/2014/main" id="{C174AD9D-801E-4E36-B429-73AEA4B57B0C}"/>
+                <a16:creationId xmlns:a16="http://schemas.microsoft.com/office/drawing/2014/main" xmlns="" id="{C174AD9D-801E-4E36-B429-73AEA4B57B0C}"/>
               </a:ext>
             </a:extLst>
           </p:cNvPr>
@@ -6612,7 +6710,7 @@
           <a:p>
             <a:fld id="{CB1CC682-AAA3-4FC4-8E84-60287101582C}" type="datetime1">
               <a:rPr lang="en-US" smtClean="0"/>
-              <a:t>8/18/2017</a:t>
+              <a:t>9/7/17</a:t>
             </a:fld>
             <a:endParaRPr lang="en-US"/>
           </a:p>
@@ -6623,7 +6721,7 @@
           <p:cNvPr id="6" name="Footer Placeholder 5">
             <a:extLst>
               <a:ext uri="{FF2B5EF4-FFF2-40B4-BE49-F238E27FC236}">
-                <a16:creationId xmlns:a16="http://schemas.microsoft.com/office/drawing/2014/main" id="{97B94A68-9443-47D2-B560-951B28897EFF}"/>
+                <a16:creationId xmlns:a16="http://schemas.microsoft.com/office/drawing/2014/main" xmlns="" id="{97B94A68-9443-47D2-B560-951B28897EFF}"/>
               </a:ext>
             </a:extLst>
           </p:cNvPr>
@@ -6651,7 +6749,7 @@
           <p:cNvPr id="7" name="Slide Number Placeholder 6">
             <a:extLst>
               <a:ext uri="{FF2B5EF4-FFF2-40B4-BE49-F238E27FC236}">
-                <a16:creationId xmlns:a16="http://schemas.microsoft.com/office/drawing/2014/main" id="{F438819F-91DF-4A40-80EB-1685B134B514}"/>
+                <a16:creationId xmlns:a16="http://schemas.microsoft.com/office/drawing/2014/main" xmlns="" id="{F438819F-91DF-4A40-80EB-1685B134B514}"/>
               </a:ext>
             </a:extLst>
           </p:cNvPr>
@@ -6710,7 +6808,7 @@
           <p:cNvPr id="2" name="Title 1">
             <a:extLst>
               <a:ext uri="{FF2B5EF4-FFF2-40B4-BE49-F238E27FC236}">
-                <a16:creationId xmlns:a16="http://schemas.microsoft.com/office/drawing/2014/main" id="{44807965-E449-40D9-99AE-AB46077A7F6C}"/>
+                <a16:creationId xmlns:a16="http://schemas.microsoft.com/office/drawing/2014/main" xmlns="" id="{44807965-E449-40D9-99AE-AB46077A7F6C}"/>
               </a:ext>
             </a:extLst>
           </p:cNvPr>
@@ -6747,7 +6845,7 @@
           <p:cNvPr id="3" name="Picture Placeholder 2">
             <a:extLst>
               <a:ext uri="{FF2B5EF4-FFF2-40B4-BE49-F238E27FC236}">
-                <a16:creationId xmlns:a16="http://schemas.microsoft.com/office/drawing/2014/main" id="{BB6BF32F-FF47-4497-8017-61E95C74E3E0}"/>
+                <a16:creationId xmlns:a16="http://schemas.microsoft.com/office/drawing/2014/main" xmlns="" id="{BB6BF32F-FF47-4497-8017-61E95C74E3E0}"/>
               </a:ext>
             </a:extLst>
           </p:cNvPr>
@@ -6814,7 +6912,7 @@
           <p:cNvPr id="4" name="Text Placeholder 3">
             <a:extLst>
               <a:ext uri="{FF2B5EF4-FFF2-40B4-BE49-F238E27FC236}">
-                <a16:creationId xmlns:a16="http://schemas.microsoft.com/office/drawing/2014/main" id="{117A3614-6A6D-49D5-B462-ABB3012BAC34}"/>
+                <a16:creationId xmlns:a16="http://schemas.microsoft.com/office/drawing/2014/main" xmlns="" id="{117A3614-6A6D-49D5-B462-ABB3012BAC34}"/>
               </a:ext>
             </a:extLst>
           </p:cNvPr>
@@ -6885,7 +6983,7 @@
           <p:cNvPr id="5" name="Date Placeholder 4">
             <a:extLst>
               <a:ext uri="{FF2B5EF4-FFF2-40B4-BE49-F238E27FC236}">
-                <a16:creationId xmlns:a16="http://schemas.microsoft.com/office/drawing/2014/main" id="{CA704D5C-1761-487D-B884-F89F58560224}"/>
+                <a16:creationId xmlns:a16="http://schemas.microsoft.com/office/drawing/2014/main" xmlns="" id="{CA704D5C-1761-487D-B884-F89F58560224}"/>
               </a:ext>
             </a:extLst>
           </p:cNvPr>
@@ -6903,7 +7001,7 @@
           <a:p>
             <a:fld id="{C5B79EF9-C369-4A8C-B4BC-D461BD19175E}" type="datetime1">
               <a:rPr lang="en-US" smtClean="0"/>
-              <a:t>8/18/2017</a:t>
+              <a:t>9/7/17</a:t>
             </a:fld>
             <a:endParaRPr lang="en-US"/>
           </a:p>
@@ -6914,7 +7012,7 @@
           <p:cNvPr id="6" name="Footer Placeholder 5">
             <a:extLst>
               <a:ext uri="{FF2B5EF4-FFF2-40B4-BE49-F238E27FC236}">
-                <a16:creationId xmlns:a16="http://schemas.microsoft.com/office/drawing/2014/main" id="{4B497D41-19C6-4A58-9506-769CEF4D86F8}"/>
+                <a16:creationId xmlns:a16="http://schemas.microsoft.com/office/drawing/2014/main" xmlns="" id="{4B497D41-19C6-4A58-9506-769CEF4D86F8}"/>
               </a:ext>
             </a:extLst>
           </p:cNvPr>
@@ -6942,7 +7040,7 @@
           <p:cNvPr id="7" name="Slide Number Placeholder 6">
             <a:extLst>
               <a:ext uri="{FF2B5EF4-FFF2-40B4-BE49-F238E27FC236}">
-                <a16:creationId xmlns:a16="http://schemas.microsoft.com/office/drawing/2014/main" id="{775D4B4E-C236-418E-8E21-6F225B802C1D}"/>
+                <a16:creationId xmlns:a16="http://schemas.microsoft.com/office/drawing/2014/main" xmlns="" id="{775D4B4E-C236-418E-8E21-6F225B802C1D}"/>
               </a:ext>
             </a:extLst>
           </p:cNvPr>
@@ -7011,7 +7109,7 @@
           <p:cNvPr id="2" name="Title Placeholder 1">
             <a:extLst>
               <a:ext uri="{FF2B5EF4-FFF2-40B4-BE49-F238E27FC236}">
-                <a16:creationId xmlns:a16="http://schemas.microsoft.com/office/drawing/2014/main" id="{A3482D18-CB19-42AA-962E-4C8A97E58BB4}"/>
+                <a16:creationId xmlns:a16="http://schemas.microsoft.com/office/drawing/2014/main" xmlns="" id="{A3482D18-CB19-42AA-962E-4C8A97E58BB4}"/>
               </a:ext>
             </a:extLst>
           </p:cNvPr>
@@ -7049,7 +7147,7 @@
           <p:cNvPr id="3" name="Text Placeholder 2">
             <a:extLst>
               <a:ext uri="{FF2B5EF4-FFF2-40B4-BE49-F238E27FC236}">
-                <a16:creationId xmlns:a16="http://schemas.microsoft.com/office/drawing/2014/main" id="{D59E55C8-7359-4E69-89DB-0E13EE8A7469}"/>
+                <a16:creationId xmlns:a16="http://schemas.microsoft.com/office/drawing/2014/main" xmlns="" id="{D59E55C8-7359-4E69-89DB-0E13EE8A7469}"/>
               </a:ext>
             </a:extLst>
           </p:cNvPr>
@@ -7116,7 +7214,7 @@
           <p:cNvPr id="4" name="Date Placeholder 3">
             <a:extLst>
               <a:ext uri="{FF2B5EF4-FFF2-40B4-BE49-F238E27FC236}">
-                <a16:creationId xmlns:a16="http://schemas.microsoft.com/office/drawing/2014/main" id="{B5D2C1EA-6827-4999-8401-354F7DEFD084}"/>
+                <a16:creationId xmlns:a16="http://schemas.microsoft.com/office/drawing/2014/main" xmlns="" id="{B5D2C1EA-6827-4999-8401-354F7DEFD084}"/>
               </a:ext>
             </a:extLst>
           </p:cNvPr>
@@ -7152,7 +7250,7 @@
           <a:p>
             <a:fld id="{81B268DD-388A-4713-B02F-B1A184AAABEF}" type="datetime1">
               <a:rPr lang="en-US" smtClean="0"/>
-              <a:t>8/18/2017</a:t>
+              <a:t>9/7/17</a:t>
             </a:fld>
             <a:endParaRPr lang="en-US"/>
           </a:p>
@@ -7163,7 +7261,7 @@
           <p:cNvPr id="5" name="Footer Placeholder 4">
             <a:extLst>
               <a:ext uri="{FF2B5EF4-FFF2-40B4-BE49-F238E27FC236}">
-                <a16:creationId xmlns:a16="http://schemas.microsoft.com/office/drawing/2014/main" id="{849E65FA-240D-4A01-88A2-BBDBBF2A4F71}"/>
+                <a16:creationId xmlns:a16="http://schemas.microsoft.com/office/drawing/2014/main" xmlns="" id="{849E65FA-240D-4A01-88A2-BBDBBF2A4F71}"/>
               </a:ext>
             </a:extLst>
           </p:cNvPr>
@@ -7209,7 +7307,7 @@
           <p:cNvPr id="6" name="Slide Number Placeholder 5">
             <a:extLst>
               <a:ext uri="{FF2B5EF4-FFF2-40B4-BE49-F238E27FC236}">
-                <a16:creationId xmlns:a16="http://schemas.microsoft.com/office/drawing/2014/main" id="{EA869674-04FC-4F56-823D-244240A32A89}"/>
+                <a16:creationId xmlns:a16="http://schemas.microsoft.com/office/drawing/2014/main" xmlns="" id="{EA869674-04FC-4F56-823D-244240A32A89}"/>
               </a:ext>
             </a:extLst>
           </p:cNvPr>
@@ -7578,7 +7676,7 @@
           <p:cNvPr id="11" name="TextBox 10">
             <a:extLst>
               <a:ext uri="{FF2B5EF4-FFF2-40B4-BE49-F238E27FC236}">
-                <a16:creationId xmlns:a16="http://schemas.microsoft.com/office/drawing/2014/main" id="{0E8E3FF4-8D3D-40FC-9559-30D24BB19446}"/>
+                <a16:creationId xmlns:a16="http://schemas.microsoft.com/office/drawing/2014/main" xmlns="" id="{0E8E3FF4-8D3D-40FC-9559-30D24BB19446}"/>
               </a:ext>
             </a:extLst>
           </p:cNvPr>
@@ -7615,7 +7713,7 @@
           <p:cNvPr id="4" name="TextBox 3">
             <a:extLst>
               <a:ext uri="{FF2B5EF4-FFF2-40B4-BE49-F238E27FC236}">
-                <a16:creationId xmlns:a16="http://schemas.microsoft.com/office/drawing/2014/main" id="{A998DB43-7EF8-4627-B2E5-5A519291734F}"/>
+                <a16:creationId xmlns:a16="http://schemas.microsoft.com/office/drawing/2014/main" xmlns="" id="{A998DB43-7EF8-4627-B2E5-5A519291734F}"/>
               </a:ext>
             </a:extLst>
           </p:cNvPr>
@@ -7721,7 +7819,7 @@
           <p:cNvPr id="10" name="Picture 9">
             <a:extLst>
               <a:ext uri="{FF2B5EF4-FFF2-40B4-BE49-F238E27FC236}">
-                <a16:creationId xmlns:a16="http://schemas.microsoft.com/office/drawing/2014/main" id="{1DA519AC-17F0-473F-B5A8-01AD203CD4C0}"/>
+                <a16:creationId xmlns:a16="http://schemas.microsoft.com/office/drawing/2014/main" xmlns="" id="{1DA519AC-17F0-473F-B5A8-01AD203CD4C0}"/>
               </a:ext>
             </a:extLst>
           </p:cNvPr>
@@ -7797,7 +7895,7 @@
           <p:cNvPr id="4" name="TextBox 3">
             <a:extLst>
               <a:ext uri="{FF2B5EF4-FFF2-40B4-BE49-F238E27FC236}">
-                <a16:creationId xmlns:a16="http://schemas.microsoft.com/office/drawing/2014/main" id="{F60DFD09-AC45-4F33-B352-CDAB149F70B8}"/>
+                <a16:creationId xmlns:a16="http://schemas.microsoft.com/office/drawing/2014/main" xmlns="" id="{F60DFD09-AC45-4F33-B352-CDAB149F70B8}"/>
               </a:ext>
             </a:extLst>
           </p:cNvPr>
@@ -7834,7 +7932,7 @@
           <p:cNvPr id="3" name="TextBox 2">
             <a:extLst>
               <a:ext uri="{FF2B5EF4-FFF2-40B4-BE49-F238E27FC236}">
-                <a16:creationId xmlns:a16="http://schemas.microsoft.com/office/drawing/2014/main" id="{8957C43E-E3DC-4876-9C5F-195DD279152E}"/>
+                <a16:creationId xmlns:a16="http://schemas.microsoft.com/office/drawing/2014/main" xmlns="" id="{8957C43E-E3DC-4876-9C5F-195DD279152E}"/>
               </a:ext>
             </a:extLst>
           </p:cNvPr>
@@ -8025,7 +8123,7 @@
           <p:cNvPr id="8" name="Slide Number Placeholder 7">
             <a:extLst>
               <a:ext uri="{FF2B5EF4-FFF2-40B4-BE49-F238E27FC236}">
-                <a16:creationId xmlns:a16="http://schemas.microsoft.com/office/drawing/2014/main" id="{9D40CF21-C5F8-459C-8C61-CF7062621A18}"/>
+                <a16:creationId xmlns:a16="http://schemas.microsoft.com/office/drawing/2014/main" xmlns="" id="{9D40CF21-C5F8-459C-8C61-CF7062621A18}"/>
               </a:ext>
             </a:extLst>
           </p:cNvPr>
@@ -8054,7 +8152,7 @@
           <p:cNvPr id="9" name="TextBox 8">
             <a:extLst>
               <a:ext uri="{FF2B5EF4-FFF2-40B4-BE49-F238E27FC236}">
-                <a16:creationId xmlns:a16="http://schemas.microsoft.com/office/drawing/2014/main" id="{93CD5A90-D50B-483D-99D9-28A3EA4D5FD0}"/>
+                <a16:creationId xmlns:a16="http://schemas.microsoft.com/office/drawing/2014/main" xmlns="" id="{93CD5A90-D50B-483D-99D9-28A3EA4D5FD0}"/>
               </a:ext>
             </a:extLst>
           </p:cNvPr>
@@ -8258,7 +8356,7 @@
           <p:cNvPr id="4" name="TextBox 3">
             <a:extLst>
               <a:ext uri="{FF2B5EF4-FFF2-40B4-BE49-F238E27FC236}">
-                <a16:creationId xmlns:a16="http://schemas.microsoft.com/office/drawing/2014/main" id="{F60DFD09-AC45-4F33-B352-CDAB149F70B8}"/>
+                <a16:creationId xmlns:a16="http://schemas.microsoft.com/office/drawing/2014/main" xmlns="" id="{F60DFD09-AC45-4F33-B352-CDAB149F70B8}"/>
               </a:ext>
             </a:extLst>
           </p:cNvPr>
@@ -8295,7 +8393,7 @@
           <p:cNvPr id="3" name="TextBox 2">
             <a:extLst>
               <a:ext uri="{FF2B5EF4-FFF2-40B4-BE49-F238E27FC236}">
-                <a16:creationId xmlns:a16="http://schemas.microsoft.com/office/drawing/2014/main" id="{8957C43E-E3DC-4876-9C5F-195DD279152E}"/>
+                <a16:creationId xmlns:a16="http://schemas.microsoft.com/office/drawing/2014/main" xmlns="" id="{8957C43E-E3DC-4876-9C5F-195DD279152E}"/>
               </a:ext>
             </a:extLst>
           </p:cNvPr>
@@ -8344,7 +8442,7 @@
           <p:cNvPr id="8" name="Slide Number Placeholder 7">
             <a:extLst>
               <a:ext uri="{FF2B5EF4-FFF2-40B4-BE49-F238E27FC236}">
-                <a16:creationId xmlns:a16="http://schemas.microsoft.com/office/drawing/2014/main" id="{9D40CF21-C5F8-459C-8C61-CF7062621A18}"/>
+                <a16:creationId xmlns:a16="http://schemas.microsoft.com/office/drawing/2014/main" xmlns="" id="{9D40CF21-C5F8-459C-8C61-CF7062621A18}"/>
               </a:ext>
             </a:extLst>
           </p:cNvPr>
@@ -8373,7 +8471,7 @@
           <p:cNvPr id="9" name="TextBox 8">
             <a:extLst>
               <a:ext uri="{FF2B5EF4-FFF2-40B4-BE49-F238E27FC236}">
-                <a16:creationId xmlns:a16="http://schemas.microsoft.com/office/drawing/2014/main" id="{93CD5A90-D50B-483D-99D9-28A3EA4D5FD0}"/>
+                <a16:creationId xmlns:a16="http://schemas.microsoft.com/office/drawing/2014/main" xmlns="" id="{93CD5A90-D50B-483D-99D9-28A3EA4D5FD0}"/>
               </a:ext>
             </a:extLst>
           </p:cNvPr>
@@ -8476,7 +8574,7 @@
           <p:cNvPr id="7" name="TextBox 6">
             <a:extLst>
               <a:ext uri="{FF2B5EF4-FFF2-40B4-BE49-F238E27FC236}">
-                <a16:creationId xmlns:a16="http://schemas.microsoft.com/office/drawing/2014/main" id="{9CA24E9C-3BEF-4AB3-8509-6C12CBAF4BF8}"/>
+                <a16:creationId xmlns:a16="http://schemas.microsoft.com/office/drawing/2014/main" xmlns="" id="{9CA24E9C-3BEF-4AB3-8509-6C12CBAF4BF8}"/>
               </a:ext>
             </a:extLst>
           </p:cNvPr>
@@ -8701,7 +8799,7 @@
           <p:cNvPr id="4" name="TextBox 3">
             <a:extLst>
               <a:ext uri="{FF2B5EF4-FFF2-40B4-BE49-F238E27FC236}">
-                <a16:creationId xmlns:a16="http://schemas.microsoft.com/office/drawing/2014/main" id="{F60DFD09-AC45-4F33-B352-CDAB149F70B8}"/>
+                <a16:creationId xmlns:a16="http://schemas.microsoft.com/office/drawing/2014/main" xmlns="" id="{F60DFD09-AC45-4F33-B352-CDAB149F70B8}"/>
               </a:ext>
             </a:extLst>
           </p:cNvPr>
@@ -8738,7 +8836,7 @@
           <p:cNvPr id="3" name="TextBox 2">
             <a:extLst>
               <a:ext uri="{FF2B5EF4-FFF2-40B4-BE49-F238E27FC236}">
-                <a16:creationId xmlns:a16="http://schemas.microsoft.com/office/drawing/2014/main" id="{8957C43E-E3DC-4876-9C5F-195DD279152E}"/>
+                <a16:creationId xmlns:a16="http://schemas.microsoft.com/office/drawing/2014/main" xmlns="" id="{8957C43E-E3DC-4876-9C5F-195DD279152E}"/>
               </a:ext>
             </a:extLst>
           </p:cNvPr>
@@ -8787,7 +8885,7 @@
           <p:cNvPr id="8" name="Slide Number Placeholder 7">
             <a:extLst>
               <a:ext uri="{FF2B5EF4-FFF2-40B4-BE49-F238E27FC236}">
-                <a16:creationId xmlns:a16="http://schemas.microsoft.com/office/drawing/2014/main" id="{9D40CF21-C5F8-459C-8C61-CF7062621A18}"/>
+                <a16:creationId xmlns:a16="http://schemas.microsoft.com/office/drawing/2014/main" xmlns="" id="{9D40CF21-C5F8-459C-8C61-CF7062621A18}"/>
               </a:ext>
             </a:extLst>
           </p:cNvPr>
@@ -8816,7 +8914,7 @@
           <p:cNvPr id="9" name="TextBox 8">
             <a:extLst>
               <a:ext uri="{FF2B5EF4-FFF2-40B4-BE49-F238E27FC236}">
-                <a16:creationId xmlns:a16="http://schemas.microsoft.com/office/drawing/2014/main" id="{93CD5A90-D50B-483D-99D9-28A3EA4D5FD0}"/>
+                <a16:creationId xmlns:a16="http://schemas.microsoft.com/office/drawing/2014/main" xmlns="" id="{93CD5A90-D50B-483D-99D9-28A3EA4D5FD0}"/>
               </a:ext>
             </a:extLst>
           </p:cNvPr>
@@ -9158,7 +9256,7 @@
           <p:cNvPr id="4" name="TextBox 3">
             <a:extLst>
               <a:ext uri="{FF2B5EF4-FFF2-40B4-BE49-F238E27FC236}">
-                <a16:creationId xmlns:a16="http://schemas.microsoft.com/office/drawing/2014/main" id="{F60DFD09-AC45-4F33-B352-CDAB149F70B8}"/>
+                <a16:creationId xmlns:a16="http://schemas.microsoft.com/office/drawing/2014/main" xmlns="" id="{F60DFD09-AC45-4F33-B352-CDAB149F70B8}"/>
               </a:ext>
             </a:extLst>
           </p:cNvPr>
@@ -9195,7 +9293,7 @@
           <p:cNvPr id="3" name="TextBox 2">
             <a:extLst>
               <a:ext uri="{FF2B5EF4-FFF2-40B4-BE49-F238E27FC236}">
-                <a16:creationId xmlns:a16="http://schemas.microsoft.com/office/drawing/2014/main" id="{8957C43E-E3DC-4876-9C5F-195DD279152E}"/>
+                <a16:creationId xmlns:a16="http://schemas.microsoft.com/office/drawing/2014/main" xmlns="" id="{8957C43E-E3DC-4876-9C5F-195DD279152E}"/>
               </a:ext>
             </a:extLst>
           </p:cNvPr>
@@ -9257,7 +9355,7 @@
           <p:cNvPr id="8" name="Slide Number Placeholder 7">
             <a:extLst>
               <a:ext uri="{FF2B5EF4-FFF2-40B4-BE49-F238E27FC236}">
-                <a16:creationId xmlns:a16="http://schemas.microsoft.com/office/drawing/2014/main" id="{9D40CF21-C5F8-459C-8C61-CF7062621A18}"/>
+                <a16:creationId xmlns:a16="http://schemas.microsoft.com/office/drawing/2014/main" xmlns="" id="{9D40CF21-C5F8-459C-8C61-CF7062621A18}"/>
               </a:ext>
             </a:extLst>
           </p:cNvPr>
@@ -9286,7 +9384,7 @@
           <p:cNvPr id="9" name="TextBox 8">
             <a:extLst>
               <a:ext uri="{FF2B5EF4-FFF2-40B4-BE49-F238E27FC236}">
-                <a16:creationId xmlns:a16="http://schemas.microsoft.com/office/drawing/2014/main" id="{93CD5A90-D50B-483D-99D9-28A3EA4D5FD0}"/>
+                <a16:creationId xmlns:a16="http://schemas.microsoft.com/office/drawing/2014/main" xmlns="" id="{93CD5A90-D50B-483D-99D9-28A3EA4D5FD0}"/>
               </a:ext>
             </a:extLst>
           </p:cNvPr>
@@ -9512,7 +9610,7 @@
           <p:cNvPr id="9" name="TextBox 8">
             <a:extLst>
               <a:ext uri="{FF2B5EF4-FFF2-40B4-BE49-F238E27FC236}">
-                <a16:creationId xmlns:a16="http://schemas.microsoft.com/office/drawing/2014/main" id="{EB17D702-369B-4830-B0A6-0B695C87C7E7}"/>
+                <a16:creationId xmlns:a16="http://schemas.microsoft.com/office/drawing/2014/main" xmlns="" id="{EB17D702-369B-4830-B0A6-0B695C87C7E7}"/>
               </a:ext>
             </a:extLst>
           </p:cNvPr>
@@ -9549,7 +9647,7 @@
           <p:cNvPr id="4" name="TextBox 3">
             <a:extLst>
               <a:ext uri="{FF2B5EF4-FFF2-40B4-BE49-F238E27FC236}">
-                <a16:creationId xmlns:a16="http://schemas.microsoft.com/office/drawing/2014/main" id="{F60DFD09-AC45-4F33-B352-CDAB149F70B8}"/>
+                <a16:creationId xmlns:a16="http://schemas.microsoft.com/office/drawing/2014/main" xmlns="" id="{F60DFD09-AC45-4F33-B352-CDAB149F70B8}"/>
               </a:ext>
             </a:extLst>
           </p:cNvPr>
@@ -9598,7 +9696,7 @@
           <p:cNvPr id="5" name="Diagram 4">
             <a:extLst>
               <a:ext uri="{FF2B5EF4-FFF2-40B4-BE49-F238E27FC236}">
-                <a16:creationId xmlns:a16="http://schemas.microsoft.com/office/drawing/2014/main" id="{F3E30A7F-8252-4CD8-8F77-F52D9438BF25}"/>
+                <a16:creationId xmlns:a16="http://schemas.microsoft.com/office/drawing/2014/main" xmlns="" id="{F3E30A7F-8252-4CD8-8F77-F52D9438BF25}"/>
               </a:ext>
             </a:extLst>
           </p:cNvPr>
@@ -9626,7 +9724,7 @@
           <p:cNvPr id="3" name="Slide Number Placeholder 2">
             <a:extLst>
               <a:ext uri="{FF2B5EF4-FFF2-40B4-BE49-F238E27FC236}">
-                <a16:creationId xmlns:a16="http://schemas.microsoft.com/office/drawing/2014/main" id="{4A10DE1B-86B5-46F7-9D2C-A5005B996E29}"/>
+                <a16:creationId xmlns:a16="http://schemas.microsoft.com/office/drawing/2014/main" xmlns="" id="{4A10DE1B-86B5-46F7-9D2C-A5005B996E29}"/>
               </a:ext>
             </a:extLst>
           </p:cNvPr>
@@ -9685,7 +9783,7 @@
           <p:cNvPr id="4" name="TextBox 3">
             <a:extLst>
               <a:ext uri="{FF2B5EF4-FFF2-40B4-BE49-F238E27FC236}">
-                <a16:creationId xmlns:a16="http://schemas.microsoft.com/office/drawing/2014/main" id="{F60DFD09-AC45-4F33-B352-CDAB149F70B8}"/>
+                <a16:creationId xmlns:a16="http://schemas.microsoft.com/office/drawing/2014/main" xmlns="" id="{F60DFD09-AC45-4F33-B352-CDAB149F70B8}"/>
               </a:ext>
             </a:extLst>
           </p:cNvPr>
@@ -9722,7 +9820,7 @@
           <p:cNvPr id="3" name="TextBox 2">
             <a:extLst>
               <a:ext uri="{FF2B5EF4-FFF2-40B4-BE49-F238E27FC236}">
-                <a16:creationId xmlns:a16="http://schemas.microsoft.com/office/drawing/2014/main" id="{8957C43E-E3DC-4876-9C5F-195DD279152E}"/>
+                <a16:creationId xmlns:a16="http://schemas.microsoft.com/office/drawing/2014/main" xmlns="" id="{8957C43E-E3DC-4876-9C5F-195DD279152E}"/>
               </a:ext>
             </a:extLst>
           </p:cNvPr>
@@ -9771,7 +9869,7 @@
           <p:cNvPr id="5" name="Slide Number Placeholder 4">
             <a:extLst>
               <a:ext uri="{FF2B5EF4-FFF2-40B4-BE49-F238E27FC236}">
-                <a16:creationId xmlns:a16="http://schemas.microsoft.com/office/drawing/2014/main" id="{73B9D6A2-EEFD-4791-A00F-CB36025835D8}"/>
+                <a16:creationId xmlns:a16="http://schemas.microsoft.com/office/drawing/2014/main" xmlns="" id="{73B9D6A2-EEFD-4791-A00F-CB36025835D8}"/>
               </a:ext>
             </a:extLst>
           </p:cNvPr>
@@ -9830,7 +9928,7 @@
           <p:cNvPr id="3" name="TextBox 2">
             <a:extLst>
               <a:ext uri="{FF2B5EF4-FFF2-40B4-BE49-F238E27FC236}">
-                <a16:creationId xmlns:a16="http://schemas.microsoft.com/office/drawing/2014/main" id="{8957C43E-E3DC-4876-9C5F-195DD279152E}"/>
+                <a16:creationId xmlns:a16="http://schemas.microsoft.com/office/drawing/2014/main" xmlns="" id="{8957C43E-E3DC-4876-9C5F-195DD279152E}"/>
               </a:ext>
             </a:extLst>
           </p:cNvPr>
@@ -9994,7 +10092,7 @@
           <p:cNvPr id="8" name="Slide Number Placeholder 7">
             <a:extLst>
               <a:ext uri="{FF2B5EF4-FFF2-40B4-BE49-F238E27FC236}">
-                <a16:creationId xmlns:a16="http://schemas.microsoft.com/office/drawing/2014/main" id="{1614AFD7-3C26-4513-BA08-9209C4A2C913}"/>
+                <a16:creationId xmlns:a16="http://schemas.microsoft.com/office/drawing/2014/main" xmlns="" id="{1614AFD7-3C26-4513-BA08-9209C4A2C913}"/>
               </a:ext>
             </a:extLst>
           </p:cNvPr>
@@ -10023,7 +10121,7 @@
           <p:cNvPr id="9" name="TextBox 8">
             <a:extLst>
               <a:ext uri="{FF2B5EF4-FFF2-40B4-BE49-F238E27FC236}">
-                <a16:creationId xmlns:a16="http://schemas.microsoft.com/office/drawing/2014/main" id="{1F3145B1-E360-4BF5-98DB-16C4AF442B72}"/>
+                <a16:creationId xmlns:a16="http://schemas.microsoft.com/office/drawing/2014/main" xmlns="" id="{1F3145B1-E360-4BF5-98DB-16C4AF442B72}"/>
               </a:ext>
             </a:extLst>
           </p:cNvPr>
@@ -10173,7 +10271,7 @@
           <p:cNvPr id="10" name="TextBox 9">
             <a:extLst>
               <a:ext uri="{FF2B5EF4-FFF2-40B4-BE49-F238E27FC236}">
-                <a16:creationId xmlns:a16="http://schemas.microsoft.com/office/drawing/2014/main" id="{EDAC5547-B2B0-4345-9C8E-36534DE92E7E}"/>
+                <a16:creationId xmlns:a16="http://schemas.microsoft.com/office/drawing/2014/main" xmlns="" id="{EDAC5547-B2B0-4345-9C8E-36534DE92E7E}"/>
               </a:ext>
             </a:extLst>
           </p:cNvPr>
@@ -10324,7 +10422,7 @@
           <p:cNvPr id="4" name="TextBox 3">
             <a:extLst>
               <a:ext uri="{FF2B5EF4-FFF2-40B4-BE49-F238E27FC236}">
-                <a16:creationId xmlns:a16="http://schemas.microsoft.com/office/drawing/2014/main" id="{F60DFD09-AC45-4F33-B352-CDAB149F70B8}"/>
+                <a16:creationId xmlns:a16="http://schemas.microsoft.com/office/drawing/2014/main" xmlns="" id="{F60DFD09-AC45-4F33-B352-CDAB149F70B8}"/>
               </a:ext>
             </a:extLst>
           </p:cNvPr>
@@ -10361,7 +10459,7 @@
           <p:cNvPr id="3" name="TextBox 2">
             <a:extLst>
               <a:ext uri="{FF2B5EF4-FFF2-40B4-BE49-F238E27FC236}">
-                <a16:creationId xmlns:a16="http://schemas.microsoft.com/office/drawing/2014/main" id="{8957C43E-E3DC-4876-9C5F-195DD279152E}"/>
+                <a16:creationId xmlns:a16="http://schemas.microsoft.com/office/drawing/2014/main" xmlns="" id="{8957C43E-E3DC-4876-9C5F-195DD279152E}"/>
               </a:ext>
             </a:extLst>
           </p:cNvPr>
@@ -10612,7 +10710,7 @@
           <p:cNvPr id="8" name="Slide Number Placeholder 7">
             <a:extLst>
               <a:ext uri="{FF2B5EF4-FFF2-40B4-BE49-F238E27FC236}">
-                <a16:creationId xmlns:a16="http://schemas.microsoft.com/office/drawing/2014/main" id="{9D40CF21-C5F8-459C-8C61-CF7062621A18}"/>
+                <a16:creationId xmlns:a16="http://schemas.microsoft.com/office/drawing/2014/main" xmlns="" id="{9D40CF21-C5F8-459C-8C61-CF7062621A18}"/>
               </a:ext>
             </a:extLst>
           </p:cNvPr>
@@ -10671,7 +10769,7 @@
           <p:cNvPr id="4" name="TextBox 3">
             <a:extLst>
               <a:ext uri="{FF2B5EF4-FFF2-40B4-BE49-F238E27FC236}">
-                <a16:creationId xmlns:a16="http://schemas.microsoft.com/office/drawing/2014/main" id="{F60DFD09-AC45-4F33-B352-CDAB149F70B8}"/>
+                <a16:creationId xmlns:a16="http://schemas.microsoft.com/office/drawing/2014/main" xmlns="" id="{F60DFD09-AC45-4F33-B352-CDAB149F70B8}"/>
               </a:ext>
             </a:extLst>
           </p:cNvPr>
@@ -10708,7 +10806,7 @@
           <p:cNvPr id="3" name="TextBox 2">
             <a:extLst>
               <a:ext uri="{FF2B5EF4-FFF2-40B4-BE49-F238E27FC236}">
-                <a16:creationId xmlns:a16="http://schemas.microsoft.com/office/drawing/2014/main" id="{8957C43E-E3DC-4876-9C5F-195DD279152E}"/>
+                <a16:creationId xmlns:a16="http://schemas.microsoft.com/office/drawing/2014/main" xmlns="" id="{8957C43E-E3DC-4876-9C5F-195DD279152E}"/>
               </a:ext>
             </a:extLst>
           </p:cNvPr>
@@ -10864,6 +10962,10 @@
             <a:br>
               <a:rPr lang="en-US" sz="1400" b="1" dirty="0"/>
             </a:br>
+            <a:r>
+              <a:rPr lang="en-US" sz="1400" b="1" dirty="0"/>
+              <a:t/>
+            </a:r>
             <a:br>
               <a:rPr lang="en-US" sz="1400" b="1" dirty="0"/>
             </a:br>
@@ -10919,7 +11021,7 @@
           <p:cNvPr id="8" name="Slide Number Placeholder 7">
             <a:extLst>
               <a:ext uri="{FF2B5EF4-FFF2-40B4-BE49-F238E27FC236}">
-                <a16:creationId xmlns:a16="http://schemas.microsoft.com/office/drawing/2014/main" id="{9D40CF21-C5F8-459C-8C61-CF7062621A18}"/>
+                <a16:creationId xmlns:a16="http://schemas.microsoft.com/office/drawing/2014/main" xmlns="" id="{9D40CF21-C5F8-459C-8C61-CF7062621A18}"/>
               </a:ext>
             </a:extLst>
           </p:cNvPr>
@@ -11132,7 +11234,7 @@
           <p:cNvPr id="4" name="TextBox 3">
             <a:extLst>
               <a:ext uri="{FF2B5EF4-FFF2-40B4-BE49-F238E27FC236}">
-                <a16:creationId xmlns:a16="http://schemas.microsoft.com/office/drawing/2014/main" id="{F60DFD09-AC45-4F33-B352-CDAB149F70B8}"/>
+                <a16:creationId xmlns:a16="http://schemas.microsoft.com/office/drawing/2014/main" xmlns="" id="{F60DFD09-AC45-4F33-B352-CDAB149F70B8}"/>
               </a:ext>
             </a:extLst>
           </p:cNvPr>
@@ -11169,7 +11271,7 @@
           <p:cNvPr id="3" name="TextBox 2">
             <a:extLst>
               <a:ext uri="{FF2B5EF4-FFF2-40B4-BE49-F238E27FC236}">
-                <a16:creationId xmlns:a16="http://schemas.microsoft.com/office/drawing/2014/main" id="{8957C43E-E3DC-4876-9C5F-195DD279152E}"/>
+                <a16:creationId xmlns:a16="http://schemas.microsoft.com/office/drawing/2014/main" xmlns="" id="{8957C43E-E3DC-4876-9C5F-195DD279152E}"/>
               </a:ext>
             </a:extLst>
           </p:cNvPr>
@@ -11346,7 +11448,7 @@
           <p:cNvPr id="8" name="Slide Number Placeholder 7">
             <a:extLst>
               <a:ext uri="{FF2B5EF4-FFF2-40B4-BE49-F238E27FC236}">
-                <a16:creationId xmlns:a16="http://schemas.microsoft.com/office/drawing/2014/main" id="{9D40CF21-C5F8-459C-8C61-CF7062621A18}"/>
+                <a16:creationId xmlns:a16="http://schemas.microsoft.com/office/drawing/2014/main" xmlns="" id="{9D40CF21-C5F8-459C-8C61-CF7062621A18}"/>
               </a:ext>
             </a:extLst>
           </p:cNvPr>
@@ -11596,7 +11698,7 @@
           <p:cNvPr id="4" name="TextBox 3">
             <a:extLst>
               <a:ext uri="{FF2B5EF4-FFF2-40B4-BE49-F238E27FC236}">
-                <a16:creationId xmlns:a16="http://schemas.microsoft.com/office/drawing/2014/main" id="{F60DFD09-AC45-4F33-B352-CDAB149F70B8}"/>
+                <a16:creationId xmlns:a16="http://schemas.microsoft.com/office/drawing/2014/main" xmlns="" id="{F60DFD09-AC45-4F33-B352-CDAB149F70B8}"/>
               </a:ext>
             </a:extLst>
           </p:cNvPr>
@@ -11633,7 +11735,7 @@
           <p:cNvPr id="3" name="TextBox 2">
             <a:extLst>
               <a:ext uri="{FF2B5EF4-FFF2-40B4-BE49-F238E27FC236}">
-                <a16:creationId xmlns:a16="http://schemas.microsoft.com/office/drawing/2014/main" id="{8957C43E-E3DC-4876-9C5F-195DD279152E}"/>
+                <a16:creationId xmlns:a16="http://schemas.microsoft.com/office/drawing/2014/main" xmlns="" id="{8957C43E-E3DC-4876-9C5F-195DD279152E}"/>
               </a:ext>
             </a:extLst>
           </p:cNvPr>
@@ -11817,6 +11919,10 @@
               <a:rPr lang="en-US" sz="1200" b="1" dirty="0"/>
               <a:t>     #Method logic</a:t>
             </a:r>
+            <a:r>
+              <a:rPr lang="en-US" sz="1200" dirty="0"/>
+              <a:t/>
+            </a:r>
             <a:br>
               <a:rPr lang="en-US" sz="1200" dirty="0"/>
             </a:br>
@@ -11868,7 +11974,7 @@
           <p:cNvPr id="8" name="Slide Number Placeholder 7">
             <a:extLst>
               <a:ext uri="{FF2B5EF4-FFF2-40B4-BE49-F238E27FC236}">
-                <a16:creationId xmlns:a16="http://schemas.microsoft.com/office/drawing/2014/main" id="{9D40CF21-C5F8-459C-8C61-CF7062621A18}"/>
+                <a16:creationId xmlns:a16="http://schemas.microsoft.com/office/drawing/2014/main" xmlns="" id="{9D40CF21-C5F8-459C-8C61-CF7062621A18}"/>
               </a:ext>
             </a:extLst>
           </p:cNvPr>
@@ -11897,7 +12003,7 @@
           <p:cNvPr id="9" name="TextBox 8">
             <a:extLst>
               <a:ext uri="{FF2B5EF4-FFF2-40B4-BE49-F238E27FC236}">
-                <a16:creationId xmlns:a16="http://schemas.microsoft.com/office/drawing/2014/main" id="{983628B3-1B52-452C-90FF-C0E76B8AEA7E}"/>
+                <a16:creationId xmlns:a16="http://schemas.microsoft.com/office/drawing/2014/main" xmlns="" id="{983628B3-1B52-452C-90FF-C0E76B8AEA7E}"/>
               </a:ext>
             </a:extLst>
           </p:cNvPr>
@@ -12093,7 +12199,7 @@
           <p:cNvPr id="4" name="TextBox 3">
             <a:extLst>
               <a:ext uri="{FF2B5EF4-FFF2-40B4-BE49-F238E27FC236}">
-                <a16:creationId xmlns:a16="http://schemas.microsoft.com/office/drawing/2014/main" id="{F60DFD09-AC45-4F33-B352-CDAB149F70B8}"/>
+                <a16:creationId xmlns:a16="http://schemas.microsoft.com/office/drawing/2014/main" xmlns="" id="{F60DFD09-AC45-4F33-B352-CDAB149F70B8}"/>
               </a:ext>
             </a:extLst>
           </p:cNvPr>
@@ -12130,7 +12236,7 @@
           <p:cNvPr id="3" name="TextBox 2">
             <a:extLst>
               <a:ext uri="{FF2B5EF4-FFF2-40B4-BE49-F238E27FC236}">
-                <a16:creationId xmlns:a16="http://schemas.microsoft.com/office/drawing/2014/main" id="{8957C43E-E3DC-4876-9C5F-195DD279152E}"/>
+                <a16:creationId xmlns:a16="http://schemas.microsoft.com/office/drawing/2014/main" xmlns="" id="{8957C43E-E3DC-4876-9C5F-195DD279152E}"/>
               </a:ext>
             </a:extLst>
           </p:cNvPr>
@@ -12358,7 +12464,7 @@
           <p:cNvPr id="8" name="Slide Number Placeholder 7">
             <a:extLst>
               <a:ext uri="{FF2B5EF4-FFF2-40B4-BE49-F238E27FC236}">
-                <a16:creationId xmlns:a16="http://schemas.microsoft.com/office/drawing/2014/main" id="{9D40CF21-C5F8-459C-8C61-CF7062621A18}"/>
+                <a16:creationId xmlns:a16="http://schemas.microsoft.com/office/drawing/2014/main" xmlns="" id="{9D40CF21-C5F8-459C-8C61-CF7062621A18}"/>
               </a:ext>
             </a:extLst>
           </p:cNvPr>

</xml_diff>